<commit_message>
add inertia estimate and exports to France
</commit_message>
<xml_diff>
--- a/reports/Apragon_April28.pptx
+++ b/reports/Apragon_April28.pptx
@@ -5,7 +5,7 @@
     <p:sldMasterId id="2147483648" r:id="rId3"/>
   </p:sldMasterIdLst>
   <p:notesMasterIdLst>
-    <p:notesMasterId r:id="rId22"/>
+    <p:notesMasterId r:id="rId23"/>
   </p:notesMasterIdLst>
   <p:sldIdLst>
     <p:sldId id="256" r:id="rId4"/>
@@ -21,11 +21,12 @@
     <p:sldId id="337" r:id="rId14"/>
     <p:sldId id="338" r:id="rId15"/>
     <p:sldId id="339" r:id="rId16"/>
-    <p:sldId id="334" r:id="rId17"/>
-    <p:sldId id="260" r:id="rId18"/>
-    <p:sldId id="261" r:id="rId19"/>
-    <p:sldId id="311" r:id="rId20"/>
-    <p:sldId id="310" r:id="rId21"/>
+    <p:sldId id="340" r:id="rId17"/>
+    <p:sldId id="334" r:id="rId18"/>
+    <p:sldId id="260" r:id="rId19"/>
+    <p:sldId id="261" r:id="rId20"/>
+    <p:sldId id="311" r:id="rId21"/>
+    <p:sldId id="310" r:id="rId22"/>
   </p:sldIdLst>
   <p:sldSz cx="12192000" cy="6858000"/>
   <p:notesSz cx="6858000" cy="9144000"/>
@@ -1141,7 +1142,7 @@
                 <a:latin typeface="Cabin Regular" pitchFamily="2" charset="0"/>
               </a:rPr>
               <a:pPr/>
-              <a:t>17</a:t>
+              <a:t>18</a:t>
             </a:fld>
             <a:endParaRPr lang="es-ES" altLang="es-ES">
               <a:latin typeface="Cabin Regular" pitchFamily="2" charset="0"/>
@@ -8189,6 +8190,380 @@
         <p:cNvPr id="1" name="">
           <a:extLst>
             <a:ext uri="{FF2B5EF4-FFF2-40B4-BE49-F238E27FC236}">
+              <a16:creationId xmlns:a16="http://schemas.microsoft.com/office/drawing/2014/main" id="{84A61950-AC74-A022-A579-FC48C23ED994}"/>
+            </a:ext>
+          </a:extLst>
+        </p:cNvPr>
+        <p:cNvGrpSpPr/>
+        <p:nvPr/>
+      </p:nvGrpSpPr>
+      <p:grpSpPr>
+        <a:xfrm>
+          <a:off x="0" y="0"/>
+          <a:ext cx="0" cy="0"/>
+          <a:chOff x="0" y="0"/>
+          <a:chExt cx="0" cy="0"/>
+        </a:xfrm>
+      </p:grpSpPr>
+      <p:pic>
+        <p:nvPicPr>
+          <p:cNvPr id="22" name="Picture 21" descr="A graph with red line&#10;&#10;AI-generated content may be incorrect.">
+            <a:extLst>
+              <a:ext uri="{FF2B5EF4-FFF2-40B4-BE49-F238E27FC236}">
+                <a16:creationId xmlns:a16="http://schemas.microsoft.com/office/drawing/2014/main" id="{ABFBA1B2-EFCD-16E9-C3B8-F022F09A3207}"/>
+              </a:ext>
+            </a:extLst>
+          </p:cNvPr>
+          <p:cNvPicPr>
+            <a:picLocks noChangeAspect="1"/>
+          </p:cNvPicPr>
+          <p:nvPr/>
+        </p:nvPicPr>
+        <p:blipFill>
+          <a:blip r:embed="rId2"/>
+          <a:stretch>
+            <a:fillRect/>
+          </a:stretch>
+        </p:blipFill>
+        <p:spPr>
+          <a:xfrm>
+            <a:off x="1271332" y="975436"/>
+            <a:ext cx="10761828" cy="5380914"/>
+          </a:xfrm>
+          <a:prstGeom prst="rect">
+            <a:avLst/>
+          </a:prstGeom>
+        </p:spPr>
+      </p:pic>
+      <p:sp>
+        <p:nvSpPr>
+          <p:cNvPr id="5" name="Slide Number Placeholder 4">
+            <a:extLst>
+              <a:ext uri="{FF2B5EF4-FFF2-40B4-BE49-F238E27FC236}">
+                <a16:creationId xmlns:a16="http://schemas.microsoft.com/office/drawing/2014/main" id="{F7741830-4C9C-A346-42BF-B605543FB90A}"/>
+              </a:ext>
+            </a:extLst>
+          </p:cNvPr>
+          <p:cNvSpPr>
+            <a:spLocks noGrp="1"/>
+          </p:cNvSpPr>
+          <p:nvPr>
+            <p:ph type="sldNum" sz="quarter" idx="12"/>
+          </p:nvPr>
+        </p:nvSpPr>
+        <p:spPr/>
+        <p:txBody>
+          <a:bodyPr/>
+          <a:lstStyle/>
+          <a:p>
+            <a:fld id="{D86B3D54-5C84-4380-B90C-31F636633DA2}" type="slidenum">
+              <a:rPr lang="es-ES" altLang="es-ES" smtClean="0"/>
+              <a:pPr/>
+              <a:t>14</a:t>
+            </a:fld>
+            <a:endParaRPr lang="es-ES" altLang="es-ES"/>
+          </a:p>
+        </p:txBody>
+      </p:sp>
+      <p:pic>
+        <p:nvPicPr>
+          <p:cNvPr id="15" name="Imagen 5">
+            <a:extLst>
+              <a:ext uri="{FF2B5EF4-FFF2-40B4-BE49-F238E27FC236}">
+                <a16:creationId xmlns:a16="http://schemas.microsoft.com/office/drawing/2014/main" id="{3A4D26DC-0B45-9012-DF44-26EF1DC9269B}"/>
+              </a:ext>
+            </a:extLst>
+          </p:cNvPr>
+          <p:cNvPicPr>
+            <a:picLocks noChangeAspect="1" noChangeArrowheads="1"/>
+          </p:cNvPicPr>
+          <p:nvPr/>
+        </p:nvPicPr>
+        <p:blipFill>
+          <a:blip r:embed="rId3">
+            <a:extLst>
+              <a:ext uri="{28A0092B-C50C-407E-A947-70E740481C1C}">
+                <a14:useLocalDpi xmlns:a14="http://schemas.microsoft.com/office/drawing/2010/main" val="0"/>
+              </a:ext>
+            </a:extLst>
+          </a:blip>
+          <a:srcRect/>
+          <a:stretch>
+            <a:fillRect/>
+          </a:stretch>
+        </p:blipFill>
+        <p:spPr bwMode="auto">
+          <a:xfrm>
+            <a:off x="11129080" y="122503"/>
+            <a:ext cx="904080" cy="809624"/>
+          </a:xfrm>
+          <a:prstGeom prst="rect">
+            <a:avLst/>
+          </a:prstGeom>
+          <a:noFill/>
+          <a:ln>
+            <a:noFill/>
+          </a:ln>
+          <a:extLst>
+            <a:ext uri="{909E8E84-426E-40DD-AFC4-6F175D3DCCD1}">
+              <a14:hiddenFill xmlns:a14="http://schemas.microsoft.com/office/drawing/2010/main">
+                <a:solidFill>
+                  <a:srgbClr val="FFFFFF"/>
+                </a:solidFill>
+              </a14:hiddenFill>
+            </a:ext>
+            <a:ext uri="{91240B29-F687-4F45-9708-019B960494DF}">
+              <a14:hiddenLine xmlns:a14="http://schemas.microsoft.com/office/drawing/2010/main" w="9525">
+                <a:solidFill>
+                  <a:srgbClr val="000000"/>
+                </a:solidFill>
+                <a:miter lim="800000"/>
+                <a:headEnd/>
+                <a:tailEnd/>
+              </a14:hiddenLine>
+            </a:ext>
+          </a:extLst>
+        </p:spPr>
+      </p:pic>
+      <p:pic>
+        <p:nvPicPr>
+          <p:cNvPr id="16" name="Picture 2">
+            <a:extLst>
+              <a:ext uri="{FF2B5EF4-FFF2-40B4-BE49-F238E27FC236}">
+                <a16:creationId xmlns:a16="http://schemas.microsoft.com/office/drawing/2014/main" id="{ABBB38EF-0429-9184-F8CF-9137F4349E54}"/>
+              </a:ext>
+            </a:extLst>
+          </p:cNvPr>
+          <p:cNvPicPr>
+            <a:picLocks noChangeAspect="1" noChangeArrowheads="1"/>
+          </p:cNvPicPr>
+          <p:nvPr/>
+        </p:nvPicPr>
+        <p:blipFill>
+          <a:blip r:embed="rId4">
+            <a:extLst>
+              <a:ext uri="{28A0092B-C50C-407E-A947-70E740481C1C}">
+                <a14:useLocalDpi xmlns:a14="http://schemas.microsoft.com/office/drawing/2010/main" val="0"/>
+              </a:ext>
+            </a:extLst>
+          </a:blip>
+          <a:srcRect/>
+          <a:stretch>
+            <a:fillRect/>
+          </a:stretch>
+        </p:blipFill>
+        <p:spPr bwMode="auto">
+          <a:xfrm>
+            <a:off x="158840" y="122503"/>
+            <a:ext cx="1097236" cy="809624"/>
+          </a:xfrm>
+          <a:prstGeom prst="rect">
+            <a:avLst/>
+          </a:prstGeom>
+          <a:noFill/>
+          <a:ln>
+            <a:noFill/>
+          </a:ln>
+          <a:extLst>
+            <a:ext uri="{909E8E84-426E-40DD-AFC4-6F175D3DCCD1}">
+              <a14:hiddenFill xmlns:a14="http://schemas.microsoft.com/office/drawing/2010/main">
+                <a:solidFill>
+                  <a:srgbClr val="FFFFFF"/>
+                </a:solidFill>
+              </a14:hiddenFill>
+            </a:ext>
+            <a:ext uri="{91240B29-F687-4F45-9708-019B960494DF}">
+              <a14:hiddenLine xmlns:a14="http://schemas.microsoft.com/office/drawing/2010/main" w="9525">
+                <a:solidFill>
+                  <a:srgbClr val="000000"/>
+                </a:solidFill>
+                <a:miter lim="800000"/>
+                <a:headEnd/>
+                <a:tailEnd/>
+              </a14:hiddenLine>
+            </a:ext>
+          </a:extLst>
+        </p:spPr>
+      </p:pic>
+      <p:sp>
+        <p:nvSpPr>
+          <p:cNvPr id="17" name="Title 1">
+            <a:extLst>
+              <a:ext uri="{FF2B5EF4-FFF2-40B4-BE49-F238E27FC236}">
+                <a16:creationId xmlns:a16="http://schemas.microsoft.com/office/drawing/2014/main" id="{BFA2F926-A2A2-8E9E-9AAC-B41A8510BC98}"/>
+              </a:ext>
+            </a:extLst>
+          </p:cNvPr>
+          <p:cNvSpPr>
+            <a:spLocks noGrp="1"/>
+          </p:cNvSpPr>
+          <p:nvPr>
+            <p:ph type="title"/>
+          </p:nvPr>
+        </p:nvSpPr>
+        <p:spPr>
+          <a:xfrm>
+            <a:off x="1251857" y="252094"/>
+            <a:ext cx="9541481" cy="593751"/>
+          </a:xfrm>
+        </p:spPr>
+        <p:txBody>
+          <a:bodyPr/>
+          <a:lstStyle/>
+          <a:p>
+            <a:r>
+              <a:rPr lang="en-US" dirty="0"/>
+              <a:t>Exports to France were below average</a:t>
+            </a:r>
+          </a:p>
+        </p:txBody>
+      </p:sp>
+      <p:sp>
+        <p:nvSpPr>
+          <p:cNvPr id="7" name="TextBox 6">
+            <a:extLst>
+              <a:ext uri="{FF2B5EF4-FFF2-40B4-BE49-F238E27FC236}">
+                <a16:creationId xmlns:a16="http://schemas.microsoft.com/office/drawing/2014/main" id="{83C4B21F-D171-6088-2FB8-CC54A3760011}"/>
+              </a:ext>
+            </a:extLst>
+          </p:cNvPr>
+          <p:cNvSpPr txBox="1"/>
+          <p:nvPr/>
+        </p:nvSpPr>
+        <p:spPr>
+          <a:xfrm>
+            <a:off x="4345497" y="1595190"/>
+            <a:ext cx="5557707" cy="369332"/>
+          </a:xfrm>
+          <a:prstGeom prst="rect">
+            <a:avLst/>
+          </a:prstGeom>
+          <a:solidFill>
+            <a:srgbClr val="E9E9E9"/>
+          </a:solidFill>
+        </p:spPr>
+        <p:txBody>
+          <a:bodyPr wrap="square" rtlCol="0">
+            <a:spAutoFit/>
+          </a:bodyPr>
+          <a:lstStyle/>
+          <a:p>
+            <a:r>
+              <a:rPr lang="en-US" dirty="0"/>
+              <a:t>~6am, exports to France fall below the seasonal average.</a:t>
+            </a:r>
+          </a:p>
+        </p:txBody>
+      </p:sp>
+      <p:cxnSp>
+        <p:nvCxnSpPr>
+          <p:cNvPr id="8" name="Straight Arrow Connector 7">
+            <a:extLst>
+              <a:ext uri="{FF2B5EF4-FFF2-40B4-BE49-F238E27FC236}">
+                <a16:creationId xmlns:a16="http://schemas.microsoft.com/office/drawing/2014/main" id="{D97E605A-A4DF-CE2C-E0C2-4DD95C5F9836}"/>
+              </a:ext>
+            </a:extLst>
+          </p:cNvPr>
+          <p:cNvCxnSpPr>
+            <a:cxnSpLocks/>
+          </p:cNvCxnSpPr>
+          <p:nvPr/>
+        </p:nvCxnSpPr>
+        <p:spPr>
+          <a:xfrm flipH="1">
+            <a:off x="3741490" y="1964522"/>
+            <a:ext cx="604007" cy="535397"/>
+          </a:xfrm>
+          <a:prstGeom prst="straightConnector1">
+            <a:avLst/>
+          </a:prstGeom>
+          <a:ln w="38100">
+            <a:solidFill>
+              <a:srgbClr val="FFCC28"/>
+            </a:solidFill>
+            <a:tailEnd type="triangle"/>
+          </a:ln>
+        </p:spPr>
+        <p:style>
+          <a:lnRef idx="1">
+            <a:schemeClr val="accent1"/>
+          </a:lnRef>
+          <a:fillRef idx="0">
+            <a:schemeClr val="accent1"/>
+          </a:fillRef>
+          <a:effectRef idx="0">
+            <a:schemeClr val="accent1"/>
+          </a:effectRef>
+          <a:fontRef idx="minor">
+            <a:schemeClr val="tx1"/>
+          </a:fontRef>
+        </p:style>
+      </p:cxnSp>
+      <p:cxnSp>
+        <p:nvCxnSpPr>
+          <p:cNvPr id="11" name="Straight Arrow Connector 10">
+            <a:extLst>
+              <a:ext uri="{FF2B5EF4-FFF2-40B4-BE49-F238E27FC236}">
+                <a16:creationId xmlns:a16="http://schemas.microsoft.com/office/drawing/2014/main" id="{1D2BEA48-AF6E-DBE8-4A46-D898F4E5C62E}"/>
+              </a:ext>
+            </a:extLst>
+          </p:cNvPr>
+          <p:cNvCxnSpPr>
+            <a:cxnSpLocks/>
+          </p:cNvCxnSpPr>
+          <p:nvPr/>
+        </p:nvCxnSpPr>
+        <p:spPr>
+          <a:xfrm>
+            <a:off x="4404220" y="1964522"/>
+            <a:ext cx="365621" cy="1055515"/>
+          </a:xfrm>
+          <a:prstGeom prst="straightConnector1">
+            <a:avLst/>
+          </a:prstGeom>
+          <a:ln w="38100">
+            <a:solidFill>
+              <a:srgbClr val="FFCC28"/>
+            </a:solidFill>
+            <a:tailEnd type="triangle"/>
+          </a:ln>
+        </p:spPr>
+        <p:style>
+          <a:lnRef idx="1">
+            <a:schemeClr val="accent1"/>
+          </a:lnRef>
+          <a:fillRef idx="0">
+            <a:schemeClr val="accent1"/>
+          </a:fillRef>
+          <a:effectRef idx="0">
+            <a:schemeClr val="accent1"/>
+          </a:effectRef>
+          <a:fontRef idx="minor">
+            <a:schemeClr val="tx1"/>
+          </a:fontRef>
+        </p:style>
+      </p:cxnSp>
+    </p:spTree>
+    <p:extLst>
+      <p:ext uri="{BB962C8B-B14F-4D97-AF65-F5344CB8AC3E}">
+        <p14:creationId xmlns:p14="http://schemas.microsoft.com/office/powerpoint/2010/main" val="599183188"/>
+      </p:ext>
+    </p:extLst>
+  </p:cSld>
+  <p:clrMapOvr>
+    <a:masterClrMapping/>
+  </p:clrMapOvr>
+</p:sld>
+</file>
+
+<file path=ppt/slides/slide15.xml><?xml version="1.0" encoding="utf-8"?>
+<p:sld xmlns:a="http://schemas.openxmlformats.org/drawingml/2006/main" xmlns:r="http://schemas.openxmlformats.org/officeDocument/2006/relationships" xmlns:p="http://schemas.openxmlformats.org/presentationml/2006/main">
+  <p:cSld>
+    <p:spTree>
+      <p:nvGrpSpPr>
+        <p:cNvPr id="1" name="">
+          <a:extLst>
+            <a:ext uri="{FF2B5EF4-FFF2-40B4-BE49-F238E27FC236}">
               <a16:creationId xmlns:a16="http://schemas.microsoft.com/office/drawing/2014/main" id="{BB7EF2D4-BDDA-4675-9E5D-EAA76C4CD249}"/>
             </a:ext>
           </a:extLst>
@@ -8392,7 +8767,7 @@
                 <a:latin typeface="Cabin Regular" pitchFamily="2" charset="0"/>
               </a:rPr>
               <a:pPr/>
-              <a:t>14</a:t>
+              <a:t>15</a:t>
             </a:fld>
             <a:endParaRPr lang="es-ES" altLang="es-ES">
               <a:solidFill>
@@ -8660,7 +9035,7 @@
 </p:sld>
 </file>
 
-<file path=ppt/slides/slide15.xml><?xml version="1.0" encoding="utf-8"?>
+<file path=ppt/slides/slide16.xml><?xml version="1.0" encoding="utf-8"?>
 <p:sld xmlns:a="http://schemas.openxmlformats.org/drawingml/2006/main" xmlns:r="http://schemas.openxmlformats.org/officeDocument/2006/relationships" xmlns:p="http://schemas.openxmlformats.org/presentationml/2006/main">
   <p:cSld>
     <p:spTree>
@@ -8803,7 +9178,7 @@
                 <a:latin typeface="Cabin Regular" pitchFamily="2" charset="0"/>
               </a:rPr>
               <a:pPr/>
-              <a:t>15</a:t>
+              <a:t>16</a:t>
             </a:fld>
             <a:endParaRPr lang="es-ES" altLang="es-ES">
               <a:solidFill>
@@ -9733,7 +10108,7 @@
 </p:sld>
 </file>
 
-<file path=ppt/slides/slide16.xml><?xml version="1.0" encoding="utf-8"?>
+<file path=ppt/slides/slide17.xml><?xml version="1.0" encoding="utf-8"?>
 <p:sld xmlns:a="http://schemas.openxmlformats.org/drawingml/2006/main" xmlns:r="http://schemas.openxmlformats.org/officeDocument/2006/relationships" xmlns:p="http://schemas.openxmlformats.org/presentationml/2006/main">
   <p:cSld>
     <p:spTree>
@@ -9876,7 +10251,7 @@
                 <a:latin typeface="Cabin Regular" pitchFamily="2" charset="0"/>
               </a:rPr>
               <a:pPr/>
-              <a:t>16</a:t>
+              <a:t>17</a:t>
             </a:fld>
             <a:endParaRPr lang="es-ES" altLang="es-ES">
               <a:solidFill>
@@ -11703,7 +12078,7 @@
 </p:sld>
 </file>
 
-<file path=ppt/slides/slide17.xml><?xml version="1.0" encoding="utf-8"?>
+<file path=ppt/slides/slide18.xml><?xml version="1.0" encoding="utf-8"?>
 <p:sld xmlns:a="http://schemas.openxmlformats.org/drawingml/2006/main" xmlns:r="http://schemas.openxmlformats.org/officeDocument/2006/relationships" xmlns:p="http://schemas.openxmlformats.org/presentationml/2006/main">
   <p:cSld>
     <p:spTree>
@@ -11846,7 +12221,7 @@
                 <a:latin typeface="Cabin Regular" pitchFamily="2" charset="0"/>
               </a:rPr>
               <a:pPr/>
-              <a:t>17</a:t>
+              <a:t>18</a:t>
             </a:fld>
             <a:endParaRPr lang="es-ES" altLang="es-ES">
               <a:solidFill>
@@ -12693,7 +13068,7 @@
 </p:sld>
 </file>
 
-<file path=ppt/slides/slide18.xml><?xml version="1.0" encoding="utf-8"?>
+<file path=ppt/slides/slide19.xml><?xml version="1.0" encoding="utf-8"?>
 <p:sld xmlns:a="http://schemas.openxmlformats.org/drawingml/2006/main" xmlns:r="http://schemas.openxmlformats.org/officeDocument/2006/relationships" xmlns:p="http://schemas.openxmlformats.org/presentationml/2006/main">
   <p:cSld>
     <p:spTree>
@@ -12985,7 +13360,7 @@
             <a:fld id="{F80BEE8C-9BC8-4092-9420-3642836EC31C}" type="slidenum">
               <a:rPr lang="es-ES" altLang="es-ES" smtClean="0"/>
               <a:pPr/>
-              <a:t>18</a:t>
+              <a:t>19</a:t>
             </a:fld>
             <a:endParaRPr lang="es-ES" altLang="es-ES"/>
           </a:p>

</xml_diff>

<commit_message>
bump reports (pptx and pdf)
</commit_message>
<xml_diff>
--- a/reports/Apragon_April28.pptx
+++ b/reports/Apragon_April28.pptx
@@ -11,19 +11,19 @@
     <p:sldId id="256" r:id="rId4"/>
     <p:sldId id="259" r:id="rId5"/>
     <p:sldId id="341" r:id="rId6"/>
-    <p:sldId id="342" r:id="rId7"/>
-    <p:sldId id="328" r:id="rId8"/>
-    <p:sldId id="329" r:id="rId9"/>
-    <p:sldId id="330" r:id="rId10"/>
-    <p:sldId id="331" r:id="rId11"/>
-    <p:sldId id="332" r:id="rId12"/>
-    <p:sldId id="333" r:id="rId13"/>
-    <p:sldId id="335" r:id="rId14"/>
-    <p:sldId id="336" r:id="rId15"/>
-    <p:sldId id="337" r:id="rId16"/>
-    <p:sldId id="338" r:id="rId17"/>
-    <p:sldId id="339" r:id="rId18"/>
-    <p:sldId id="340" r:id="rId19"/>
+    <p:sldId id="328" r:id="rId7"/>
+    <p:sldId id="329" r:id="rId8"/>
+    <p:sldId id="330" r:id="rId9"/>
+    <p:sldId id="331" r:id="rId10"/>
+    <p:sldId id="332" r:id="rId11"/>
+    <p:sldId id="333" r:id="rId12"/>
+    <p:sldId id="335" r:id="rId13"/>
+    <p:sldId id="336" r:id="rId14"/>
+    <p:sldId id="337" r:id="rId15"/>
+    <p:sldId id="338" r:id="rId16"/>
+    <p:sldId id="339" r:id="rId17"/>
+    <p:sldId id="340" r:id="rId18"/>
+    <p:sldId id="342" r:id="rId19"/>
     <p:sldId id="344" r:id="rId20"/>
     <p:sldId id="343" r:id="rId21"/>
     <p:sldId id="334" r:id="rId22"/>
@@ -6319,7 +6319,7 @@
         <p:cNvPr id="1" name="">
           <a:extLst>
             <a:ext uri="{FF2B5EF4-FFF2-40B4-BE49-F238E27FC236}">
-              <a16:creationId xmlns:a16="http://schemas.microsoft.com/office/drawing/2014/main" id="{C0A527B7-B1D5-0298-CCB2-AF3DBB000A33}"/>
+              <a16:creationId xmlns:a16="http://schemas.microsoft.com/office/drawing/2014/main" id="{4268C67E-1B58-9CE1-5EA2-AEFFA1946821}"/>
             </a:ext>
           </a:extLst>
         </p:cNvPr>
@@ -6334,74 +6334,42 @@
           <a:chExt cx="0" cy="0"/>
         </a:xfrm>
       </p:grpSpPr>
+      <p:pic>
+        <p:nvPicPr>
+          <p:cNvPr id="3" name="Picture 2" descr="A graph with blue and red lines&#10;&#10;AI-generated content may be incorrect.">
+            <a:extLst>
+              <a:ext uri="{FF2B5EF4-FFF2-40B4-BE49-F238E27FC236}">
+                <a16:creationId xmlns:a16="http://schemas.microsoft.com/office/drawing/2014/main" id="{A1B26E07-77BA-70BA-EE0B-FA5126A0BF61}"/>
+              </a:ext>
+            </a:extLst>
+          </p:cNvPr>
+          <p:cNvPicPr>
+            <a:picLocks noChangeAspect="1"/>
+          </p:cNvPicPr>
+          <p:nvPr/>
+        </p:nvPicPr>
+        <p:blipFill>
+          <a:blip r:embed="rId2"/>
+          <a:stretch>
+            <a:fillRect/>
+          </a:stretch>
+        </p:blipFill>
+        <p:spPr>
+          <a:xfrm>
+            <a:off x="1271332" y="975436"/>
+            <a:ext cx="10761828" cy="5380914"/>
+          </a:xfrm>
+          <a:prstGeom prst="rect">
+            <a:avLst/>
+          </a:prstGeom>
+        </p:spPr>
+      </p:pic>
       <p:sp>
         <p:nvSpPr>
-          <p:cNvPr id="7" name="Paralelogramo 6">
-            <a:extLst>
-              <a:ext uri="{FF2B5EF4-FFF2-40B4-BE49-F238E27FC236}">
-                <a16:creationId xmlns:a16="http://schemas.microsoft.com/office/drawing/2014/main" id="{F6545BFE-BB10-8421-40F3-000D4C50A5F6}"/>
-              </a:ext>
-            </a:extLst>
-          </p:cNvPr>
-          <p:cNvSpPr/>
-          <p:nvPr/>
-        </p:nvSpPr>
-        <p:spPr>
-          <a:xfrm flipH="1">
-            <a:off x="0" y="0"/>
-            <a:ext cx="5527675" cy="6858000"/>
-          </a:xfrm>
-          <a:prstGeom prst="parallelogram">
-            <a:avLst/>
-          </a:prstGeom>
-          <a:solidFill>
-            <a:srgbClr val="FFCC28"/>
-          </a:solidFill>
-          <a:ln>
-            <a:noFill/>
-          </a:ln>
-        </p:spPr>
-        <p:style>
-          <a:lnRef idx="2">
-            <a:schemeClr val="accent1">
-              <a:shade val="50000"/>
-            </a:schemeClr>
-          </a:lnRef>
-          <a:fillRef idx="1">
-            <a:schemeClr val="accent1"/>
-          </a:fillRef>
-          <a:effectRef idx="0">
-            <a:schemeClr val="accent1"/>
-          </a:effectRef>
-          <a:fontRef idx="minor">
-            <a:schemeClr val="lt1"/>
-          </a:fontRef>
-        </p:style>
-        <p:txBody>
-          <a:bodyPr anchor="ctr"/>
-          <a:lstStyle/>
-          <a:p>
-            <a:pPr algn="ctr" eaLnBrk="1" fontAlgn="auto" hangingPunct="1">
-              <a:spcBef>
-                <a:spcPts val="0"/>
-              </a:spcBef>
-              <a:spcAft>
-                <a:spcPts val="0"/>
-              </a:spcAft>
-              <a:defRPr/>
-            </a:pPr>
-            <a:endParaRPr lang="es-ES">
-              <a:latin typeface="Cabin Regular" pitchFamily="2" charset="77"/>
-            </a:endParaRPr>
-          </a:p>
-        </p:txBody>
-      </p:sp>
-      <p:sp>
-        <p:nvSpPr>
-          <p:cNvPr id="3" name="Marcador de número de diapositiva 2">
-            <a:extLst>
-              <a:ext uri="{FF2B5EF4-FFF2-40B4-BE49-F238E27FC236}">
-                <a16:creationId xmlns:a16="http://schemas.microsoft.com/office/drawing/2014/main" id="{A9B32B6B-286D-B587-85B4-1FC507B9E343}"/>
+          <p:cNvPr id="5" name="Slide Number Placeholder 4">
+            <a:extLst>
+              <a:ext uri="{FF2B5EF4-FFF2-40B4-BE49-F238E27FC236}">
+                <a16:creationId xmlns:a16="http://schemas.microsoft.com/office/drawing/2014/main" id="{105AA40D-D4BE-11CB-E902-CC0B8BC4E429}"/>
               </a:ext>
             </a:extLst>
           </p:cNvPr>
@@ -6415,130 +6383,23 @@
         <p:spPr/>
         <p:txBody>
           <a:bodyPr/>
-          <a:lstStyle>
-            <a:lvl1pPr>
-              <a:defRPr>
-                <a:solidFill>
-                  <a:schemeClr val="tx1"/>
-                </a:solidFill>
-                <a:latin typeface="Calibri" panose="020F0502020204030204" pitchFamily="34" charset="0"/>
-              </a:defRPr>
-            </a:lvl1pPr>
-            <a:lvl2pPr marL="742950" indent="-285750">
-              <a:defRPr>
-                <a:solidFill>
-                  <a:schemeClr val="tx1"/>
-                </a:solidFill>
-                <a:latin typeface="Calibri" panose="020F0502020204030204" pitchFamily="34" charset="0"/>
-              </a:defRPr>
-            </a:lvl2pPr>
-            <a:lvl3pPr marL="1143000" indent="-228600">
-              <a:defRPr>
-                <a:solidFill>
-                  <a:schemeClr val="tx1"/>
-                </a:solidFill>
-                <a:latin typeface="Calibri" panose="020F0502020204030204" pitchFamily="34" charset="0"/>
-              </a:defRPr>
-            </a:lvl3pPr>
-            <a:lvl4pPr marL="1600200" indent="-228600">
-              <a:defRPr>
-                <a:solidFill>
-                  <a:schemeClr val="tx1"/>
-                </a:solidFill>
-                <a:latin typeface="Calibri" panose="020F0502020204030204" pitchFamily="34" charset="0"/>
-              </a:defRPr>
-            </a:lvl4pPr>
-            <a:lvl5pPr marL="2057400" indent="-228600">
-              <a:defRPr>
-                <a:solidFill>
-                  <a:schemeClr val="tx1"/>
-                </a:solidFill>
-                <a:latin typeface="Calibri" panose="020F0502020204030204" pitchFamily="34" charset="0"/>
-              </a:defRPr>
-            </a:lvl5pPr>
-            <a:lvl6pPr marL="2514600" indent="-228600" fontAlgn="base">
-              <a:spcBef>
-                <a:spcPct val="0"/>
-              </a:spcBef>
-              <a:spcAft>
-                <a:spcPct val="0"/>
-              </a:spcAft>
-              <a:defRPr>
-                <a:solidFill>
-                  <a:schemeClr val="tx1"/>
-                </a:solidFill>
-                <a:latin typeface="Calibri" panose="020F0502020204030204" pitchFamily="34" charset="0"/>
-              </a:defRPr>
-            </a:lvl6pPr>
-            <a:lvl7pPr marL="2971800" indent="-228600" fontAlgn="base">
-              <a:spcBef>
-                <a:spcPct val="0"/>
-              </a:spcBef>
-              <a:spcAft>
-                <a:spcPct val="0"/>
-              </a:spcAft>
-              <a:defRPr>
-                <a:solidFill>
-                  <a:schemeClr val="tx1"/>
-                </a:solidFill>
-                <a:latin typeface="Calibri" panose="020F0502020204030204" pitchFamily="34" charset="0"/>
-              </a:defRPr>
-            </a:lvl7pPr>
-            <a:lvl8pPr marL="3429000" indent="-228600" fontAlgn="base">
-              <a:spcBef>
-                <a:spcPct val="0"/>
-              </a:spcBef>
-              <a:spcAft>
-                <a:spcPct val="0"/>
-              </a:spcAft>
-              <a:defRPr>
-                <a:solidFill>
-                  <a:schemeClr val="tx1"/>
-                </a:solidFill>
-                <a:latin typeface="Calibri" panose="020F0502020204030204" pitchFamily="34" charset="0"/>
-              </a:defRPr>
-            </a:lvl8pPr>
-            <a:lvl9pPr marL="3886200" indent="-228600" fontAlgn="base">
-              <a:spcBef>
-                <a:spcPct val="0"/>
-              </a:spcBef>
-              <a:spcAft>
-                <a:spcPct val="0"/>
-              </a:spcAft>
-              <a:defRPr>
-                <a:solidFill>
-                  <a:schemeClr val="tx1"/>
-                </a:solidFill>
-                <a:latin typeface="Calibri" panose="020F0502020204030204" pitchFamily="34" charset="0"/>
-              </a:defRPr>
-            </a:lvl9pPr>
-          </a:lstStyle>
-          <a:p>
-            <a:fld id="{75AE09BB-B6BF-466C-9F64-2188A5A41A10}" type="slidenum">
-              <a:rPr lang="es-ES" altLang="es-ES">
-                <a:solidFill>
-                  <a:srgbClr val="898989"/>
-                </a:solidFill>
-                <a:latin typeface="Cabin Regular" pitchFamily="2" charset="0"/>
-              </a:rPr>
+          <a:lstStyle/>
+          <a:p>
+            <a:fld id="{D86B3D54-5C84-4380-B90C-31F636633DA2}" type="slidenum">
+              <a:rPr lang="es-ES" altLang="es-ES" smtClean="0"/>
               <a:pPr/>
               <a:t>10</a:t>
             </a:fld>
-            <a:endParaRPr lang="es-ES" altLang="es-ES">
-              <a:solidFill>
-                <a:srgbClr val="898989"/>
-              </a:solidFill>
-              <a:latin typeface="Cabin Regular" pitchFamily="2" charset="0"/>
-            </a:endParaRPr>
+            <a:endParaRPr lang="es-ES" altLang="es-ES"/>
           </a:p>
         </p:txBody>
       </p:sp>
       <p:sp>
         <p:nvSpPr>
-          <p:cNvPr id="4" name="CuadroTexto 3">
-            <a:extLst>
-              <a:ext uri="{FF2B5EF4-FFF2-40B4-BE49-F238E27FC236}">
-                <a16:creationId xmlns:a16="http://schemas.microsoft.com/office/drawing/2014/main" id="{E3D53BAC-3FFA-7F26-0128-B8726748F888}"/>
+          <p:cNvPr id="85" name="TextBox 84">
+            <a:extLst>
+              <a:ext uri="{FF2B5EF4-FFF2-40B4-BE49-F238E27FC236}">
+                <a16:creationId xmlns:a16="http://schemas.microsoft.com/office/drawing/2014/main" id="{DAC0C50A-38C2-98D9-D8FC-41749C1392F9}"/>
               </a:ext>
             </a:extLst>
           </p:cNvPr>
@@ -6547,325 +6408,65 @@
         </p:nvSpPr>
         <p:spPr>
           <a:xfrm>
-            <a:off x="2252664" y="2787650"/>
-            <a:ext cx="8778860" cy="646331"/>
-          </a:xfrm>
-          <a:prstGeom prst="rect">
-            <a:avLst/>
-          </a:prstGeom>
-          <a:noFill/>
-        </p:spPr>
-        <p:txBody>
-          <a:bodyPr wrap="square">
-            <a:spAutoFit/>
-          </a:bodyPr>
-          <a:lstStyle/>
-          <a:p>
-            <a:pPr eaLnBrk="1" fontAlgn="auto" hangingPunct="1">
-              <a:spcBef>
-                <a:spcPts val="0"/>
-              </a:spcBef>
-              <a:spcAft>
-                <a:spcPts val="0"/>
-              </a:spcAft>
-              <a:defRPr/>
-            </a:pPr>
-            <a:r>
-              <a:rPr lang="es-ES" sz="3600" b="1" spc="300" dirty="0" err="1">
-                <a:latin typeface="Open Sans Extrabold" panose="020B0606030504020204" pitchFamily="34" charset="0"/>
-                <a:ea typeface="Open Sans Extrabold" panose="020B0606030504020204" pitchFamily="34" charset="0"/>
-                <a:cs typeface="Open Sans Extrabold" panose="020B0606030504020204" pitchFamily="34" charset="0"/>
-              </a:rPr>
-              <a:t>Rate</a:t>
-            </a:r>
-            <a:r>
-              <a:rPr lang="es-ES" sz="3600" b="1" spc="300" dirty="0">
-                <a:latin typeface="Open Sans Extrabold" panose="020B0606030504020204" pitchFamily="34" charset="0"/>
-                <a:ea typeface="Open Sans Extrabold" panose="020B0606030504020204" pitchFamily="34" charset="0"/>
-                <a:cs typeface="Open Sans Extrabold" panose="020B0606030504020204" pitchFamily="34" charset="0"/>
-              </a:rPr>
-              <a:t> </a:t>
-            </a:r>
-            <a:r>
-              <a:rPr lang="es-ES" sz="3600" b="1" spc="300" dirty="0" err="1">
-                <a:latin typeface="Open Sans Extrabold" panose="020B0606030504020204" pitchFamily="34" charset="0"/>
-                <a:ea typeface="Open Sans Extrabold" panose="020B0606030504020204" pitchFamily="34" charset="0"/>
-                <a:cs typeface="Open Sans Extrabold" panose="020B0606030504020204" pitchFamily="34" charset="0"/>
-              </a:rPr>
-              <a:t>of</a:t>
-            </a:r>
-            <a:r>
-              <a:rPr lang="es-ES" sz="3600" b="1" spc="300" dirty="0">
-                <a:latin typeface="Open Sans Extrabold" panose="020B0606030504020204" pitchFamily="34" charset="0"/>
-                <a:ea typeface="Open Sans Extrabold" panose="020B0606030504020204" pitchFamily="34" charset="0"/>
-                <a:cs typeface="Open Sans Extrabold" panose="020B0606030504020204" pitchFamily="34" charset="0"/>
-              </a:rPr>
-              <a:t> Change </a:t>
-            </a:r>
-            <a:r>
-              <a:rPr lang="es-ES" sz="3600" b="1" spc="300" dirty="0" err="1">
-                <a:latin typeface="Open Sans Extrabold" panose="020B0606030504020204" pitchFamily="34" charset="0"/>
-                <a:ea typeface="Open Sans Extrabold" panose="020B0606030504020204" pitchFamily="34" charset="0"/>
-                <a:cs typeface="Open Sans Extrabold" panose="020B0606030504020204" pitchFamily="34" charset="0"/>
-              </a:rPr>
-              <a:t>of</a:t>
-            </a:r>
-            <a:r>
-              <a:rPr lang="es-ES" sz="3600" b="1" spc="300" dirty="0">
-                <a:latin typeface="Open Sans Extrabold" panose="020B0606030504020204" pitchFamily="34" charset="0"/>
-                <a:ea typeface="Open Sans Extrabold" panose="020B0606030504020204" pitchFamily="34" charset="0"/>
-                <a:cs typeface="Open Sans Extrabold" panose="020B0606030504020204" pitchFamily="34" charset="0"/>
-              </a:rPr>
-              <a:t> </a:t>
-            </a:r>
-            <a:r>
-              <a:rPr lang="es-ES" sz="3600" b="1" spc="300" dirty="0" err="1">
-                <a:latin typeface="Open Sans Extrabold" panose="020B0606030504020204" pitchFamily="34" charset="0"/>
-                <a:ea typeface="Open Sans Extrabold" panose="020B0606030504020204" pitchFamily="34" charset="0"/>
-                <a:cs typeface="Open Sans Extrabold" panose="020B0606030504020204" pitchFamily="34" charset="0"/>
-              </a:rPr>
-              <a:t>Frequency</a:t>
-            </a:r>
-            <a:endParaRPr lang="es-ES" dirty="0">
-              <a:latin typeface="Cabin Regular" pitchFamily="2" charset="77"/>
-            </a:endParaRPr>
-          </a:p>
-        </p:txBody>
-      </p:sp>
-      <p:sp>
-        <p:nvSpPr>
-          <p:cNvPr id="5" name="Rectángulo 4">
-            <a:extLst>
-              <a:ext uri="{FF2B5EF4-FFF2-40B4-BE49-F238E27FC236}">
-                <a16:creationId xmlns:a16="http://schemas.microsoft.com/office/drawing/2014/main" id="{168594E2-CA84-BB04-DF14-402D08E95ED9}"/>
-              </a:ext>
-            </a:extLst>
-          </p:cNvPr>
-          <p:cNvSpPr/>
-          <p:nvPr/>
-        </p:nvSpPr>
-        <p:spPr>
-          <a:xfrm flipV="1">
-            <a:off x="8097838" y="3527425"/>
-            <a:ext cx="1751012" cy="46038"/>
+            <a:off x="6652246" y="4236328"/>
+            <a:ext cx="3718447" cy="1354217"/>
           </a:xfrm>
           <a:prstGeom prst="rect">
             <a:avLst/>
           </a:prstGeom>
           <a:solidFill>
-            <a:srgbClr val="FFCC28"/>
+            <a:srgbClr val="E9E9E9"/>
           </a:solidFill>
-          <a:ln>
-            <a:noFill/>
-          </a:ln>
-        </p:spPr>
-        <p:style>
-          <a:lnRef idx="2">
-            <a:schemeClr val="accent1">
-              <a:shade val="50000"/>
-            </a:schemeClr>
-          </a:lnRef>
-          <a:fillRef idx="1">
-            <a:schemeClr val="accent1"/>
-          </a:fillRef>
-          <a:effectRef idx="0">
-            <a:schemeClr val="accent1"/>
-          </a:effectRef>
-          <a:fontRef idx="minor">
-            <a:schemeClr val="lt1"/>
-          </a:fontRef>
-        </p:style>
+        </p:spPr>
         <p:txBody>
-          <a:bodyPr anchor="ctr"/>
-          <a:lstStyle/>
-          <a:p>
-            <a:pPr algn="ctr" eaLnBrk="1" fontAlgn="auto" hangingPunct="1">
-              <a:spcBef>
-                <a:spcPts val="0"/>
-              </a:spcBef>
-              <a:spcAft>
-                <a:spcPts val="0"/>
-              </a:spcAft>
-              <a:defRPr/>
-            </a:pPr>
-            <a:endParaRPr lang="es-ES">
-              <a:latin typeface="Cabin Regular" pitchFamily="2" charset="77"/>
-            </a:endParaRPr>
-          </a:p>
-        </p:txBody>
-      </p:sp>
-      <p:sp>
-        <p:nvSpPr>
-          <p:cNvPr id="54278" name="CuadroTexto 5">
-            <a:extLst>
-              <a:ext uri="{FF2B5EF4-FFF2-40B4-BE49-F238E27FC236}">
-                <a16:creationId xmlns:a16="http://schemas.microsoft.com/office/drawing/2014/main" id="{8C66E389-97E8-D9A6-F827-56CF5DF959F5}"/>
-              </a:ext>
-            </a:extLst>
-          </p:cNvPr>
-          <p:cNvSpPr txBox="1">
-            <a:spLocks noChangeArrowheads="1"/>
-          </p:cNvSpPr>
-          <p:nvPr/>
-        </p:nvSpPr>
-        <p:spPr bwMode="auto">
-          <a:xfrm>
-            <a:off x="2252663" y="2308225"/>
-            <a:ext cx="3937000" cy="369888"/>
-          </a:xfrm>
-          <a:prstGeom prst="rect">
-            <a:avLst/>
-          </a:prstGeom>
-          <a:noFill/>
-          <a:ln>
-            <a:noFill/>
-          </a:ln>
-          <a:extLst>
-            <a:ext uri="{909E8E84-426E-40DD-AFC4-6F175D3DCCD1}">
-              <a14:hiddenFill xmlns:a14="http://schemas.microsoft.com/office/drawing/2010/main">
-                <a:solidFill>
-                  <a:srgbClr val="FFFFFF"/>
-                </a:solidFill>
-              </a14:hiddenFill>
-            </a:ext>
-            <a:ext uri="{91240B29-F687-4F45-9708-019B960494DF}">
-              <a14:hiddenLine xmlns:a14="http://schemas.microsoft.com/office/drawing/2010/main" w="9525">
-                <a:solidFill>
-                  <a:srgbClr val="000000"/>
-                </a:solidFill>
-                <a:miter lim="800000"/>
-                <a:headEnd/>
-                <a:tailEnd/>
-              </a14:hiddenLine>
-            </a:ext>
-          </a:extLst>
-        </p:spPr>
-        <p:txBody>
-          <a:bodyPr>
+          <a:bodyPr wrap="square" rtlCol="0">
             <a:spAutoFit/>
           </a:bodyPr>
-          <a:lstStyle>
-            <a:lvl1pPr>
-              <a:defRPr>
-                <a:solidFill>
-                  <a:schemeClr val="tx1"/>
-                </a:solidFill>
-                <a:latin typeface="Calibri" panose="020F0502020204030204" pitchFamily="34" charset="0"/>
-              </a:defRPr>
-            </a:lvl1pPr>
-            <a:lvl2pPr marL="742950" indent="-285750">
-              <a:defRPr>
-                <a:solidFill>
-                  <a:schemeClr val="tx1"/>
-                </a:solidFill>
-                <a:latin typeface="Calibri" panose="020F0502020204030204" pitchFamily="34" charset="0"/>
-              </a:defRPr>
-            </a:lvl2pPr>
-            <a:lvl3pPr marL="1143000" indent="-228600">
-              <a:defRPr>
-                <a:solidFill>
-                  <a:schemeClr val="tx1"/>
-                </a:solidFill>
-                <a:latin typeface="Calibri" panose="020F0502020204030204" pitchFamily="34" charset="0"/>
-              </a:defRPr>
-            </a:lvl3pPr>
-            <a:lvl4pPr marL="1600200" indent="-228600">
-              <a:defRPr>
-                <a:solidFill>
-                  <a:schemeClr val="tx1"/>
-                </a:solidFill>
-                <a:latin typeface="Calibri" panose="020F0502020204030204" pitchFamily="34" charset="0"/>
-              </a:defRPr>
-            </a:lvl4pPr>
-            <a:lvl5pPr marL="2057400" indent="-228600">
-              <a:defRPr>
-                <a:solidFill>
-                  <a:schemeClr val="tx1"/>
-                </a:solidFill>
-                <a:latin typeface="Calibri" panose="020F0502020204030204" pitchFamily="34" charset="0"/>
-              </a:defRPr>
-            </a:lvl5pPr>
-            <a:lvl6pPr marL="2514600" indent="-228600" fontAlgn="base">
-              <a:spcBef>
-                <a:spcPct val="0"/>
-              </a:spcBef>
-              <a:spcAft>
-                <a:spcPct val="0"/>
-              </a:spcAft>
-              <a:defRPr>
-                <a:solidFill>
-                  <a:schemeClr val="tx1"/>
-                </a:solidFill>
-                <a:latin typeface="Calibri" panose="020F0502020204030204" pitchFamily="34" charset="0"/>
-              </a:defRPr>
-            </a:lvl6pPr>
-            <a:lvl7pPr marL="2971800" indent="-228600" fontAlgn="base">
-              <a:spcBef>
-                <a:spcPct val="0"/>
-              </a:spcBef>
-              <a:spcAft>
-                <a:spcPct val="0"/>
-              </a:spcAft>
-              <a:defRPr>
-                <a:solidFill>
-                  <a:schemeClr val="tx1"/>
-                </a:solidFill>
-                <a:latin typeface="Calibri" panose="020F0502020204030204" pitchFamily="34" charset="0"/>
-              </a:defRPr>
-            </a:lvl7pPr>
-            <a:lvl8pPr marL="3429000" indent="-228600" fontAlgn="base">
-              <a:spcBef>
-                <a:spcPct val="0"/>
-              </a:spcBef>
-              <a:spcAft>
-                <a:spcPct val="0"/>
-              </a:spcAft>
-              <a:defRPr>
-                <a:solidFill>
-                  <a:schemeClr val="tx1"/>
-                </a:solidFill>
-                <a:latin typeface="Calibri" panose="020F0502020204030204" pitchFamily="34" charset="0"/>
-              </a:defRPr>
-            </a:lvl8pPr>
-            <a:lvl9pPr marL="3886200" indent="-228600" fontAlgn="base">
-              <a:spcBef>
-                <a:spcPct val="0"/>
-              </a:spcBef>
-              <a:spcAft>
-                <a:spcPct val="0"/>
-              </a:spcAft>
-              <a:defRPr>
-                <a:solidFill>
-                  <a:schemeClr val="tx1"/>
-                </a:solidFill>
-                <a:latin typeface="Calibri" panose="020F0502020204030204" pitchFamily="34" charset="0"/>
-              </a:defRPr>
-            </a:lvl9pPr>
-          </a:lstStyle>
-          <a:p>
-            <a:pPr eaLnBrk="1" hangingPunct="1"/>
-            <a:r>
-              <a:rPr lang="es-ES" altLang="es-ES" b="1" dirty="0" err="1">
-                <a:latin typeface="Open Sans" panose="020B0606030504020204" pitchFamily="34" charset="0"/>
-                <a:cs typeface="Open Sans" panose="020B0606030504020204" pitchFamily="34" charset="0"/>
-              </a:rPr>
-              <a:t>Section</a:t>
-            </a:r>
-            <a:r>
-              <a:rPr lang="es-ES" altLang="es-ES" dirty="0">
-                <a:latin typeface="Cabin Regular" pitchFamily="2" charset="0"/>
-              </a:rPr>
-              <a:t> 2</a:t>
+          <a:lstStyle/>
+          <a:p>
+            <a:r>
+              <a:rPr lang="en-US" sz="1600" dirty="0"/>
+              <a:t>ES_Malaga PMU data* did not violate any of the entso-e RoCoF disconnection limits:</a:t>
+            </a:r>
+          </a:p>
+          <a:p>
+            <a:pPr marL="285750" indent="-285750">
+              <a:buFont typeface="Arial" panose="020B0604020202020204" pitchFamily="34" charset="0"/>
+              <a:buChar char="•"/>
+            </a:pPr>
+            <a:r>
+              <a:rPr lang="en-US" sz="1600" dirty="0"/>
+              <a:t>&gt; 1.25 Hz/s for 500ms </a:t>
+            </a:r>
+          </a:p>
+          <a:p>
+            <a:pPr marL="285750" indent="-285750">
+              <a:buFont typeface="Arial" panose="020B0604020202020204" pitchFamily="34" charset="0"/>
+              <a:buChar char="•"/>
+            </a:pPr>
+            <a:r>
+              <a:rPr lang="en-US" sz="1600" dirty="0"/>
+              <a:t>&gt; 1.5 Hz/s for 1s</a:t>
+            </a:r>
+          </a:p>
+          <a:p>
+            <a:pPr marL="285750" indent="-285750">
+              <a:buFont typeface="Arial" panose="020B0604020202020204" pitchFamily="34" charset="0"/>
+              <a:buChar char="•"/>
+            </a:pPr>
+            <a:r>
+              <a:rPr lang="en-US" sz="1600" dirty="0"/>
+              <a:t>&gt; 2 Hz/s for 2s</a:t>
             </a:r>
           </a:p>
         </p:txBody>
       </p:sp>
       <p:pic>
         <p:nvPicPr>
-          <p:cNvPr id="9" name="Imagen 5">
-            <a:extLst>
-              <a:ext uri="{FF2B5EF4-FFF2-40B4-BE49-F238E27FC236}">
-                <a16:creationId xmlns:a16="http://schemas.microsoft.com/office/drawing/2014/main" id="{D017E832-6263-1272-99F7-8E9D1EEC54E8}"/>
+          <p:cNvPr id="15" name="Imagen 5">
+            <a:extLst>
+              <a:ext uri="{FF2B5EF4-FFF2-40B4-BE49-F238E27FC236}">
+                <a16:creationId xmlns:a16="http://schemas.microsoft.com/office/drawing/2014/main" id="{B798418D-3BD0-DFC6-F9AE-BAE7DA190475}"/>
               </a:ext>
             </a:extLst>
           </p:cNvPr>
@@ -6875,7 +6476,7 @@
           <p:nvPr/>
         </p:nvPicPr>
         <p:blipFill>
-          <a:blip r:embed="rId2">
+          <a:blip r:embed="rId3">
             <a:extLst>
               <a:ext uri="{28A0092B-C50C-407E-A947-70E740481C1C}">
                 <a14:useLocalDpi xmlns:a14="http://schemas.microsoft.com/office/drawing/2010/main" val="0"/>
@@ -6922,10 +6523,10 @@
       </p:pic>
       <p:pic>
         <p:nvPicPr>
-          <p:cNvPr id="10" name="Picture 2">
-            <a:extLst>
-              <a:ext uri="{FF2B5EF4-FFF2-40B4-BE49-F238E27FC236}">
-                <a16:creationId xmlns:a16="http://schemas.microsoft.com/office/drawing/2014/main" id="{23620B47-66DF-0D8A-C4ED-DE956A06BB75}"/>
+          <p:cNvPr id="16" name="Picture 2">
+            <a:extLst>
+              <a:ext uri="{FF2B5EF4-FFF2-40B4-BE49-F238E27FC236}">
+                <a16:creationId xmlns:a16="http://schemas.microsoft.com/office/drawing/2014/main" id="{B01DFCE4-5305-5D5F-A2D6-2883084EF522}"/>
               </a:ext>
             </a:extLst>
           </p:cNvPr>
@@ -6935,7 +6536,7 @@
           <p:nvPr/>
         </p:nvPicPr>
         <p:blipFill>
-          <a:blip r:embed="rId3">
+          <a:blip r:embed="rId4">
             <a:extLst>
               <a:ext uri="{28A0092B-C50C-407E-A947-70E740481C1C}">
                 <a14:useLocalDpi xmlns:a14="http://schemas.microsoft.com/office/drawing/2010/main" val="0"/>
@@ -6980,289 +6581,6 @@
           </a:extLst>
         </p:spPr>
       </p:pic>
-    </p:spTree>
-    <p:extLst>
-      <p:ext uri="{BB962C8B-B14F-4D97-AF65-F5344CB8AC3E}">
-        <p14:creationId xmlns:p14="http://schemas.microsoft.com/office/powerpoint/2010/main" val="1104819674"/>
-      </p:ext>
-    </p:extLst>
-  </p:cSld>
-  <p:clrMapOvr>
-    <a:masterClrMapping/>
-  </p:clrMapOvr>
-</p:sld>
-</file>
-
-<file path=ppt/slides/slide11.xml><?xml version="1.0" encoding="utf-8"?>
-<p:sld xmlns:a="http://schemas.openxmlformats.org/drawingml/2006/main" xmlns:r="http://schemas.openxmlformats.org/officeDocument/2006/relationships" xmlns:p="http://schemas.openxmlformats.org/presentationml/2006/main">
-  <p:cSld>
-    <p:spTree>
-      <p:nvGrpSpPr>
-        <p:cNvPr id="1" name="">
-          <a:extLst>
-            <a:ext uri="{FF2B5EF4-FFF2-40B4-BE49-F238E27FC236}">
-              <a16:creationId xmlns:a16="http://schemas.microsoft.com/office/drawing/2014/main" id="{4268C67E-1B58-9CE1-5EA2-AEFFA1946821}"/>
-            </a:ext>
-          </a:extLst>
-        </p:cNvPr>
-        <p:cNvGrpSpPr/>
-        <p:nvPr/>
-      </p:nvGrpSpPr>
-      <p:grpSpPr>
-        <a:xfrm>
-          <a:off x="0" y="0"/>
-          <a:ext cx="0" cy="0"/>
-          <a:chOff x="0" y="0"/>
-          <a:chExt cx="0" cy="0"/>
-        </a:xfrm>
-      </p:grpSpPr>
-      <p:pic>
-        <p:nvPicPr>
-          <p:cNvPr id="3" name="Picture 2" descr="A graph with blue and red lines&#10;&#10;AI-generated content may be incorrect.">
-            <a:extLst>
-              <a:ext uri="{FF2B5EF4-FFF2-40B4-BE49-F238E27FC236}">
-                <a16:creationId xmlns:a16="http://schemas.microsoft.com/office/drawing/2014/main" id="{A1B26E07-77BA-70BA-EE0B-FA5126A0BF61}"/>
-              </a:ext>
-            </a:extLst>
-          </p:cNvPr>
-          <p:cNvPicPr>
-            <a:picLocks noChangeAspect="1"/>
-          </p:cNvPicPr>
-          <p:nvPr/>
-        </p:nvPicPr>
-        <p:blipFill>
-          <a:blip r:embed="rId2"/>
-          <a:stretch>
-            <a:fillRect/>
-          </a:stretch>
-        </p:blipFill>
-        <p:spPr>
-          <a:xfrm>
-            <a:off x="1271332" y="975436"/>
-            <a:ext cx="10761828" cy="5380914"/>
-          </a:xfrm>
-          <a:prstGeom prst="rect">
-            <a:avLst/>
-          </a:prstGeom>
-        </p:spPr>
-      </p:pic>
-      <p:sp>
-        <p:nvSpPr>
-          <p:cNvPr id="5" name="Slide Number Placeholder 4">
-            <a:extLst>
-              <a:ext uri="{FF2B5EF4-FFF2-40B4-BE49-F238E27FC236}">
-                <a16:creationId xmlns:a16="http://schemas.microsoft.com/office/drawing/2014/main" id="{105AA40D-D4BE-11CB-E902-CC0B8BC4E429}"/>
-              </a:ext>
-            </a:extLst>
-          </p:cNvPr>
-          <p:cNvSpPr>
-            <a:spLocks noGrp="1"/>
-          </p:cNvSpPr>
-          <p:nvPr>
-            <p:ph type="sldNum" sz="quarter" idx="12"/>
-          </p:nvPr>
-        </p:nvSpPr>
-        <p:spPr/>
-        <p:txBody>
-          <a:bodyPr/>
-          <a:lstStyle/>
-          <a:p>
-            <a:fld id="{D86B3D54-5C84-4380-B90C-31F636633DA2}" type="slidenum">
-              <a:rPr lang="es-ES" altLang="es-ES" smtClean="0"/>
-              <a:pPr/>
-              <a:t>11</a:t>
-            </a:fld>
-            <a:endParaRPr lang="es-ES" altLang="es-ES"/>
-          </a:p>
-        </p:txBody>
-      </p:sp>
-      <p:sp>
-        <p:nvSpPr>
-          <p:cNvPr id="85" name="TextBox 84">
-            <a:extLst>
-              <a:ext uri="{FF2B5EF4-FFF2-40B4-BE49-F238E27FC236}">
-                <a16:creationId xmlns:a16="http://schemas.microsoft.com/office/drawing/2014/main" id="{DAC0C50A-38C2-98D9-D8FC-41749C1392F9}"/>
-              </a:ext>
-            </a:extLst>
-          </p:cNvPr>
-          <p:cNvSpPr txBox="1"/>
-          <p:nvPr/>
-        </p:nvSpPr>
-        <p:spPr>
-          <a:xfrm>
-            <a:off x="6652246" y="4236328"/>
-            <a:ext cx="3718447" cy="1354217"/>
-          </a:xfrm>
-          <a:prstGeom prst="rect">
-            <a:avLst/>
-          </a:prstGeom>
-          <a:solidFill>
-            <a:srgbClr val="E9E9E9"/>
-          </a:solidFill>
-        </p:spPr>
-        <p:txBody>
-          <a:bodyPr wrap="square" rtlCol="0">
-            <a:spAutoFit/>
-          </a:bodyPr>
-          <a:lstStyle/>
-          <a:p>
-            <a:r>
-              <a:rPr lang="en-US" sz="1600" dirty="0"/>
-              <a:t>ES_Malaga PMU data* did not violate any of the entso-e RoCoF disconnection limits:</a:t>
-            </a:r>
-          </a:p>
-          <a:p>
-            <a:pPr marL="285750" indent="-285750">
-              <a:buFont typeface="Arial" panose="020B0604020202020204" pitchFamily="34" charset="0"/>
-              <a:buChar char="•"/>
-            </a:pPr>
-            <a:r>
-              <a:rPr lang="en-US" sz="1600" dirty="0"/>
-              <a:t>&gt; 1.25 Hz/s for 500ms </a:t>
-            </a:r>
-          </a:p>
-          <a:p>
-            <a:pPr marL="285750" indent="-285750">
-              <a:buFont typeface="Arial" panose="020B0604020202020204" pitchFamily="34" charset="0"/>
-              <a:buChar char="•"/>
-            </a:pPr>
-            <a:r>
-              <a:rPr lang="en-US" sz="1600" dirty="0"/>
-              <a:t>&gt; 1.5 Hz/s for 1s</a:t>
-            </a:r>
-          </a:p>
-          <a:p>
-            <a:pPr marL="285750" indent="-285750">
-              <a:buFont typeface="Arial" panose="020B0604020202020204" pitchFamily="34" charset="0"/>
-              <a:buChar char="•"/>
-            </a:pPr>
-            <a:r>
-              <a:rPr lang="en-US" sz="1600" dirty="0"/>
-              <a:t>&gt; 2 Hz/s for 2s</a:t>
-            </a:r>
-          </a:p>
-        </p:txBody>
-      </p:sp>
-      <p:pic>
-        <p:nvPicPr>
-          <p:cNvPr id="15" name="Imagen 5">
-            <a:extLst>
-              <a:ext uri="{FF2B5EF4-FFF2-40B4-BE49-F238E27FC236}">
-                <a16:creationId xmlns:a16="http://schemas.microsoft.com/office/drawing/2014/main" id="{B798418D-3BD0-DFC6-F9AE-BAE7DA190475}"/>
-              </a:ext>
-            </a:extLst>
-          </p:cNvPr>
-          <p:cNvPicPr>
-            <a:picLocks noChangeAspect="1" noChangeArrowheads="1"/>
-          </p:cNvPicPr>
-          <p:nvPr/>
-        </p:nvPicPr>
-        <p:blipFill>
-          <a:blip r:embed="rId3">
-            <a:extLst>
-              <a:ext uri="{28A0092B-C50C-407E-A947-70E740481C1C}">
-                <a14:useLocalDpi xmlns:a14="http://schemas.microsoft.com/office/drawing/2010/main" val="0"/>
-              </a:ext>
-            </a:extLst>
-          </a:blip>
-          <a:srcRect/>
-          <a:stretch>
-            <a:fillRect/>
-          </a:stretch>
-        </p:blipFill>
-        <p:spPr bwMode="auto">
-          <a:xfrm>
-            <a:off x="11129080" y="122503"/>
-            <a:ext cx="904080" cy="809624"/>
-          </a:xfrm>
-          <a:prstGeom prst="rect">
-            <a:avLst/>
-          </a:prstGeom>
-          <a:noFill/>
-          <a:ln>
-            <a:noFill/>
-          </a:ln>
-          <a:extLst>
-            <a:ext uri="{909E8E84-426E-40DD-AFC4-6F175D3DCCD1}">
-              <a14:hiddenFill xmlns:a14="http://schemas.microsoft.com/office/drawing/2010/main">
-                <a:solidFill>
-                  <a:srgbClr val="FFFFFF"/>
-                </a:solidFill>
-              </a14:hiddenFill>
-            </a:ext>
-            <a:ext uri="{91240B29-F687-4F45-9708-019B960494DF}">
-              <a14:hiddenLine xmlns:a14="http://schemas.microsoft.com/office/drawing/2010/main" w="9525">
-                <a:solidFill>
-                  <a:srgbClr val="000000"/>
-                </a:solidFill>
-                <a:miter lim="800000"/>
-                <a:headEnd/>
-                <a:tailEnd/>
-              </a14:hiddenLine>
-            </a:ext>
-          </a:extLst>
-        </p:spPr>
-      </p:pic>
-      <p:pic>
-        <p:nvPicPr>
-          <p:cNvPr id="16" name="Picture 2">
-            <a:extLst>
-              <a:ext uri="{FF2B5EF4-FFF2-40B4-BE49-F238E27FC236}">
-                <a16:creationId xmlns:a16="http://schemas.microsoft.com/office/drawing/2014/main" id="{B01DFCE4-5305-5D5F-A2D6-2883084EF522}"/>
-              </a:ext>
-            </a:extLst>
-          </p:cNvPr>
-          <p:cNvPicPr>
-            <a:picLocks noChangeAspect="1" noChangeArrowheads="1"/>
-          </p:cNvPicPr>
-          <p:nvPr/>
-        </p:nvPicPr>
-        <p:blipFill>
-          <a:blip r:embed="rId4">
-            <a:extLst>
-              <a:ext uri="{28A0092B-C50C-407E-A947-70E740481C1C}">
-                <a14:useLocalDpi xmlns:a14="http://schemas.microsoft.com/office/drawing/2010/main" val="0"/>
-              </a:ext>
-            </a:extLst>
-          </a:blip>
-          <a:srcRect/>
-          <a:stretch>
-            <a:fillRect/>
-          </a:stretch>
-        </p:blipFill>
-        <p:spPr bwMode="auto">
-          <a:xfrm>
-            <a:off x="158840" y="122503"/>
-            <a:ext cx="1097236" cy="809624"/>
-          </a:xfrm>
-          <a:prstGeom prst="rect">
-            <a:avLst/>
-          </a:prstGeom>
-          <a:noFill/>
-          <a:ln>
-            <a:noFill/>
-          </a:ln>
-          <a:extLst>
-            <a:ext uri="{909E8E84-426E-40DD-AFC4-6F175D3DCCD1}">
-              <a14:hiddenFill xmlns:a14="http://schemas.microsoft.com/office/drawing/2010/main">
-                <a:solidFill>
-                  <a:srgbClr val="FFFFFF"/>
-                </a:solidFill>
-              </a14:hiddenFill>
-            </a:ext>
-            <a:ext uri="{91240B29-F687-4F45-9708-019B960494DF}">
-              <a14:hiddenLine xmlns:a14="http://schemas.microsoft.com/office/drawing/2010/main" w="9525">
-                <a:solidFill>
-                  <a:srgbClr val="000000"/>
-                </a:solidFill>
-                <a:miter lim="800000"/>
-                <a:headEnd/>
-                <a:tailEnd/>
-              </a14:hiddenLine>
-            </a:ext>
-          </a:extLst>
-        </p:spPr>
-      </p:pic>
       <p:sp>
         <p:nvSpPr>
           <p:cNvPr id="17" name="Title 1">
@@ -7396,7 +6714,7 @@
 </p:sld>
 </file>
 
-<file path=ppt/slides/slide12.xml><?xml version="1.0" encoding="utf-8"?>
+<file path=ppt/slides/slide11.xml><?xml version="1.0" encoding="utf-8"?>
 <p:sld xmlns:a="http://schemas.openxmlformats.org/drawingml/2006/main" xmlns:r="http://schemas.openxmlformats.org/officeDocument/2006/relationships" xmlns:p="http://schemas.openxmlformats.org/presentationml/2006/main">
   <p:cSld>
     <p:spTree>
@@ -7473,7 +6791,7 @@
             <a:fld id="{D86B3D54-5C84-4380-B90C-31F636633DA2}" type="slidenum">
               <a:rPr lang="es-ES" altLang="es-ES" smtClean="0"/>
               <a:pPr/>
-              <a:t>12</a:t>
+              <a:t>11</a:t>
             </a:fld>
             <a:endParaRPr lang="es-ES" altLang="es-ES"/>
           </a:p>
@@ -7880,7 +7198,7 @@
 </p:sld>
 </file>
 
-<file path=ppt/slides/slide13.xml><?xml version="1.0" encoding="utf-8"?>
+<file path=ppt/slides/slide12.xml><?xml version="1.0" encoding="utf-8"?>
 <p:sld xmlns:a="http://schemas.openxmlformats.org/drawingml/2006/main" xmlns:r="http://schemas.openxmlformats.org/officeDocument/2006/relationships" xmlns:p="http://schemas.openxmlformats.org/presentationml/2006/main">
   <p:cSld>
     <p:spTree>
@@ -8091,7 +7409,7 @@
                 <a:latin typeface="Cabin Regular" pitchFamily="2" charset="0"/>
               </a:rPr>
               <a:pPr/>
-              <a:t>13</a:t>
+              <a:t>12</a:t>
             </a:fld>
             <a:endParaRPr lang="es-ES" altLang="es-ES">
               <a:solidFill>
@@ -8546,7 +7864,7 @@
 </p:sld>
 </file>
 
-<file path=ppt/slides/slide14.xml><?xml version="1.0" encoding="utf-8"?>
+<file path=ppt/slides/slide13.xml><?xml version="1.0" encoding="utf-8"?>
 <p:sld xmlns:a="http://schemas.openxmlformats.org/drawingml/2006/main" xmlns:r="http://schemas.openxmlformats.org/officeDocument/2006/relationships" xmlns:p="http://schemas.openxmlformats.org/presentationml/2006/main">
   <p:cSld>
     <p:spTree>
@@ -8593,7 +7911,7 @@
             <a:fld id="{D86B3D54-5C84-4380-B90C-31F636633DA2}" type="slidenum">
               <a:rPr lang="es-ES" altLang="es-ES" smtClean="0"/>
               <a:pPr/>
-              <a:t>14</a:t>
+              <a:t>13</a:t>
             </a:fld>
             <a:endParaRPr lang="es-ES" altLang="es-ES"/>
           </a:p>
@@ -8876,7 +8194,7 @@
 </p:sld>
 </file>
 
-<file path=ppt/slides/slide15.xml><?xml version="1.0" encoding="utf-8"?>
+<file path=ppt/slides/slide14.xml><?xml version="1.0" encoding="utf-8"?>
 <p:sld xmlns:a="http://schemas.openxmlformats.org/drawingml/2006/main" xmlns:r="http://schemas.openxmlformats.org/officeDocument/2006/relationships" xmlns:p="http://schemas.openxmlformats.org/presentationml/2006/main">
   <p:cSld>
     <p:spTree>
@@ -8953,7 +8271,7 @@
             <a:fld id="{D86B3D54-5C84-4380-B90C-31F636633DA2}" type="slidenum">
               <a:rPr lang="es-ES" altLang="es-ES" smtClean="0"/>
               <a:pPr/>
-              <a:t>15</a:t>
+              <a:t>14</a:t>
             </a:fld>
             <a:endParaRPr lang="es-ES" altLang="es-ES"/>
           </a:p>
@@ -9287,7 +8605,7 @@
 </p:sld>
 </file>
 
-<file path=ppt/slides/slide16.xml><?xml version="1.0" encoding="utf-8"?>
+<file path=ppt/slides/slide15.xml><?xml version="1.0" encoding="utf-8"?>
 <p:sld xmlns:a="http://schemas.openxmlformats.org/drawingml/2006/main" xmlns:r="http://schemas.openxmlformats.org/officeDocument/2006/relationships" xmlns:p="http://schemas.openxmlformats.org/presentationml/2006/main">
   <p:cSld>
     <p:spTree>
@@ -9364,7 +8682,7 @@
             <a:fld id="{D86B3D54-5C84-4380-B90C-31F636633DA2}" type="slidenum">
               <a:rPr lang="es-ES" altLang="es-ES" smtClean="0"/>
               <a:pPr/>
-              <a:t>16</a:t>
+              <a:t>15</a:t>
             </a:fld>
             <a:endParaRPr lang="es-ES" altLang="es-ES"/>
           </a:p>
@@ -9611,6 +8929,401 @@
     <p:extLst>
       <p:ext uri="{BB962C8B-B14F-4D97-AF65-F5344CB8AC3E}">
         <p14:creationId xmlns:p14="http://schemas.microsoft.com/office/powerpoint/2010/main" val="599183188"/>
+      </p:ext>
+    </p:extLst>
+  </p:cSld>
+  <p:clrMapOvr>
+    <a:masterClrMapping/>
+  </p:clrMapOvr>
+</p:sld>
+</file>
+
+<file path=ppt/slides/slide16.xml><?xml version="1.0" encoding="utf-8"?>
+<p:sld xmlns:a="http://schemas.openxmlformats.org/drawingml/2006/main" xmlns:r="http://schemas.openxmlformats.org/officeDocument/2006/relationships" xmlns:p="http://schemas.openxmlformats.org/presentationml/2006/main">
+  <p:cSld>
+    <p:spTree>
+      <p:nvGrpSpPr>
+        <p:cNvPr id="1" name="">
+          <a:extLst>
+            <a:ext uri="{FF2B5EF4-FFF2-40B4-BE49-F238E27FC236}">
+              <a16:creationId xmlns:a16="http://schemas.microsoft.com/office/drawing/2014/main" id="{27A9FE06-D87F-CD98-5A22-A4614CBA6AF7}"/>
+            </a:ext>
+          </a:extLst>
+        </p:cNvPr>
+        <p:cNvGrpSpPr/>
+        <p:nvPr/>
+      </p:nvGrpSpPr>
+      <p:grpSpPr>
+        <a:xfrm>
+          <a:off x="0" y="0"/>
+          <a:ext cx="0" cy="0"/>
+          <a:chOff x="0" y="0"/>
+          <a:chExt cx="0" cy="0"/>
+        </a:xfrm>
+      </p:grpSpPr>
+      <p:sp>
+        <p:nvSpPr>
+          <p:cNvPr id="2" name="Footer Placeholder 1">
+            <a:extLst>
+              <a:ext uri="{FF2B5EF4-FFF2-40B4-BE49-F238E27FC236}">
+                <a16:creationId xmlns:a16="http://schemas.microsoft.com/office/drawing/2014/main" id="{EE0ED9DC-4971-7135-E094-41273EAD7F4C}"/>
+              </a:ext>
+            </a:extLst>
+          </p:cNvPr>
+          <p:cNvSpPr>
+            <a:spLocks noGrp="1"/>
+          </p:cNvSpPr>
+          <p:nvPr>
+            <p:ph type="ftr" sz="quarter" idx="11"/>
+          </p:nvPr>
+        </p:nvSpPr>
+        <p:spPr/>
+        <p:txBody>
+          <a:bodyPr/>
+          <a:lstStyle/>
+          <a:p>
+            <a:pPr>
+              <a:defRPr/>
+            </a:pPr>
+            <a:r>
+              <a:rPr lang="en-US"/>
+              <a:t>Apagón – April 28, 2025</a:t>
+            </a:r>
+            <a:endParaRPr lang="es-ES" dirty="0"/>
+          </a:p>
+        </p:txBody>
+      </p:sp>
+      <p:sp>
+        <p:nvSpPr>
+          <p:cNvPr id="3" name="Slide Number Placeholder 2">
+            <a:extLst>
+              <a:ext uri="{FF2B5EF4-FFF2-40B4-BE49-F238E27FC236}">
+                <a16:creationId xmlns:a16="http://schemas.microsoft.com/office/drawing/2014/main" id="{DA1AC263-A9D9-91B5-039E-B431D5DB201A}"/>
+              </a:ext>
+            </a:extLst>
+          </p:cNvPr>
+          <p:cNvSpPr>
+            <a:spLocks noGrp="1"/>
+          </p:cNvSpPr>
+          <p:nvPr>
+            <p:ph type="sldNum" sz="quarter" idx="12"/>
+          </p:nvPr>
+        </p:nvSpPr>
+        <p:spPr/>
+        <p:txBody>
+          <a:bodyPr/>
+          <a:lstStyle/>
+          <a:p>
+            <a:fld id="{F80BEE8C-9BC8-4092-9420-3642836EC31C}" type="slidenum">
+              <a:rPr lang="es-ES" altLang="es-ES" smtClean="0"/>
+              <a:pPr/>
+              <a:t>16</a:t>
+            </a:fld>
+            <a:endParaRPr lang="es-ES" altLang="es-ES"/>
+          </a:p>
+        </p:txBody>
+      </p:sp>
+      <p:pic>
+        <p:nvPicPr>
+          <p:cNvPr id="6" name="Picture 5">
+            <a:extLst>
+              <a:ext uri="{FF2B5EF4-FFF2-40B4-BE49-F238E27FC236}">
+                <a16:creationId xmlns:a16="http://schemas.microsoft.com/office/drawing/2014/main" id="{916C186E-C540-88CF-BABC-2141192D1A13}"/>
+              </a:ext>
+            </a:extLst>
+          </p:cNvPr>
+          <p:cNvPicPr>
+            <a:picLocks noChangeAspect="1"/>
+          </p:cNvPicPr>
+          <p:nvPr/>
+        </p:nvPicPr>
+        <p:blipFill>
+          <a:blip r:embed="rId2"/>
+          <a:stretch>
+            <a:fillRect/>
+          </a:stretch>
+        </p:blipFill>
+        <p:spPr>
+          <a:xfrm>
+            <a:off x="211175" y="424741"/>
+            <a:ext cx="6740450" cy="5898728"/>
+          </a:xfrm>
+          <a:prstGeom prst="rect">
+            <a:avLst/>
+          </a:prstGeom>
+        </p:spPr>
+      </p:pic>
+      <p:sp>
+        <p:nvSpPr>
+          <p:cNvPr id="7" name="TextBox 6">
+            <a:extLst>
+              <a:ext uri="{FF2B5EF4-FFF2-40B4-BE49-F238E27FC236}">
+                <a16:creationId xmlns:a16="http://schemas.microsoft.com/office/drawing/2014/main" id="{12DCF635-0D85-AB20-C537-D8700FC9D89A}"/>
+              </a:ext>
+            </a:extLst>
+          </p:cNvPr>
+          <p:cNvSpPr txBox="1"/>
+          <p:nvPr/>
+        </p:nvSpPr>
+        <p:spPr>
+          <a:xfrm>
+            <a:off x="211175" y="6538912"/>
+            <a:ext cx="3827425" cy="215444"/>
+          </a:xfrm>
+          <a:prstGeom prst="rect">
+            <a:avLst/>
+          </a:prstGeom>
+          <a:noFill/>
+        </p:spPr>
+        <p:txBody>
+          <a:bodyPr wrap="square" rtlCol="0">
+            <a:spAutoFit/>
+          </a:bodyPr>
+          <a:lstStyle/>
+          <a:p>
+            <a:r>
+              <a:rPr lang="en-US" sz="800" dirty="0"/>
+              <a:t>Source: </a:t>
+            </a:r>
+            <a:r>
+              <a:rPr lang="en-US" sz="800" dirty="0">
+                <a:hlinkClick r:id="rId3"/>
+              </a:rPr>
+              <a:t>El Pais, “</a:t>
+            </a:r>
+            <a:r>
+              <a:rPr lang="en-US" sz="800" b="1" i="0" dirty="0">
+                <a:solidFill>
+                  <a:srgbClr val="111111"/>
+                </a:solidFill>
+                <a:effectLst/>
+                <a:latin typeface="MajritTx"/>
+                <a:hlinkClick r:id="rId3"/>
+              </a:rPr>
+              <a:t>¿</a:t>
+            </a:r>
+            <a:r>
+              <a:rPr lang="en-US" sz="800" b="1" i="0" dirty="0" err="1">
+                <a:solidFill>
+                  <a:srgbClr val="111111"/>
+                </a:solidFill>
+                <a:effectLst/>
+                <a:latin typeface="MajritTx"/>
+                <a:hlinkClick r:id="rId3"/>
+              </a:rPr>
+              <a:t>Qué</a:t>
+            </a:r>
+            <a:r>
+              <a:rPr lang="en-US" sz="800" b="1" i="0" dirty="0">
+                <a:solidFill>
+                  <a:srgbClr val="111111"/>
+                </a:solidFill>
+                <a:effectLst/>
+                <a:latin typeface="MajritTx"/>
+                <a:hlinkClick r:id="rId3"/>
+              </a:rPr>
+              <a:t> </a:t>
+            </a:r>
+            <a:r>
+              <a:rPr lang="en-US" sz="800" b="1" i="0" dirty="0" err="1">
+                <a:solidFill>
+                  <a:srgbClr val="111111"/>
+                </a:solidFill>
+                <a:effectLst/>
+                <a:latin typeface="MajritTx"/>
+                <a:hlinkClick r:id="rId3"/>
+              </a:rPr>
+              <a:t>causó</a:t>
+            </a:r>
+            <a:r>
+              <a:rPr lang="en-US" sz="800" b="1" i="0" dirty="0">
+                <a:solidFill>
+                  <a:srgbClr val="111111"/>
+                </a:solidFill>
+                <a:effectLst/>
+                <a:latin typeface="MajritTx"/>
+                <a:hlinkClick r:id="rId3"/>
+              </a:rPr>
+              <a:t> </a:t>
+            </a:r>
+            <a:r>
+              <a:rPr lang="en-US" sz="800" b="1" i="0" dirty="0" err="1">
+                <a:solidFill>
+                  <a:srgbClr val="111111"/>
+                </a:solidFill>
+                <a:effectLst/>
+                <a:latin typeface="MajritTx"/>
+                <a:hlinkClick r:id="rId3"/>
+              </a:rPr>
+              <a:t>el</a:t>
+            </a:r>
+            <a:r>
+              <a:rPr lang="en-US" sz="800" b="1" i="0" dirty="0">
+                <a:solidFill>
+                  <a:srgbClr val="111111"/>
+                </a:solidFill>
+                <a:effectLst/>
+                <a:latin typeface="MajritTx"/>
+                <a:hlinkClick r:id="rId3"/>
+              </a:rPr>
+              <a:t> </a:t>
+            </a:r>
+            <a:r>
+              <a:rPr lang="en-US" sz="800" b="1" i="0" dirty="0" err="1">
+                <a:solidFill>
+                  <a:srgbClr val="111111"/>
+                </a:solidFill>
+                <a:effectLst/>
+                <a:latin typeface="MajritTx"/>
+                <a:hlinkClick r:id="rId3"/>
+              </a:rPr>
+              <a:t>apagón</a:t>
+            </a:r>
+            <a:r>
+              <a:rPr lang="en-US" sz="800" b="1" i="0" dirty="0">
+                <a:solidFill>
+                  <a:srgbClr val="111111"/>
+                </a:solidFill>
+                <a:effectLst/>
+                <a:latin typeface="MajritTx"/>
+                <a:hlinkClick r:id="rId3"/>
+              </a:rPr>
+              <a:t>? </a:t>
+            </a:r>
+            <a:r>
+              <a:rPr lang="en-US" sz="800" b="1" i="0" dirty="0" err="1">
+                <a:solidFill>
+                  <a:srgbClr val="111111"/>
+                </a:solidFill>
+                <a:effectLst/>
+                <a:latin typeface="MajritTx"/>
+                <a:hlinkClick r:id="rId3"/>
+              </a:rPr>
+              <a:t>Explicación</a:t>
+            </a:r>
+            <a:r>
+              <a:rPr lang="en-US" sz="800" b="1" i="0" dirty="0">
+                <a:solidFill>
+                  <a:srgbClr val="111111"/>
+                </a:solidFill>
+                <a:effectLst/>
+                <a:latin typeface="MajritTx"/>
+                <a:hlinkClick r:id="rId3"/>
+              </a:rPr>
+              <a:t> visual y breve de lo que </a:t>
+            </a:r>
+            <a:r>
+              <a:rPr lang="en-US" sz="800" b="1" i="0" dirty="0" err="1">
+                <a:solidFill>
+                  <a:srgbClr val="111111"/>
+                </a:solidFill>
+                <a:effectLst/>
+                <a:latin typeface="MajritTx"/>
+                <a:hlinkClick r:id="rId3"/>
+              </a:rPr>
+              <a:t>sabemos</a:t>
+            </a:r>
+            <a:r>
+              <a:rPr lang="en-US" sz="800" b="1" i="0" dirty="0">
+                <a:solidFill>
+                  <a:srgbClr val="111111"/>
+                </a:solidFill>
+                <a:effectLst/>
+                <a:latin typeface="MajritTx"/>
+                <a:hlinkClick r:id="rId3"/>
+              </a:rPr>
+              <a:t>”</a:t>
+            </a:r>
+            <a:endParaRPr lang="en-US" sz="800" b="1" i="0" dirty="0">
+              <a:solidFill>
+                <a:srgbClr val="111111"/>
+              </a:solidFill>
+              <a:effectLst/>
+              <a:latin typeface="MajritTx"/>
+            </a:endParaRPr>
+          </a:p>
+        </p:txBody>
+      </p:sp>
+      <p:sp>
+        <p:nvSpPr>
+          <p:cNvPr id="9" name="TextBox 8">
+            <a:extLst>
+              <a:ext uri="{FF2B5EF4-FFF2-40B4-BE49-F238E27FC236}">
+                <a16:creationId xmlns:a16="http://schemas.microsoft.com/office/drawing/2014/main" id="{067C6305-2230-D18D-FB7A-A3EE39A6C58A}"/>
+              </a:ext>
+            </a:extLst>
+          </p:cNvPr>
+          <p:cNvSpPr txBox="1"/>
+          <p:nvPr/>
+        </p:nvSpPr>
+        <p:spPr>
+          <a:xfrm>
+            <a:off x="6951625" y="4483632"/>
+            <a:ext cx="2743201" cy="646331"/>
+          </a:xfrm>
+          <a:prstGeom prst="rect">
+            <a:avLst/>
+          </a:prstGeom>
+          <a:solidFill>
+            <a:srgbClr val="E9E9E9"/>
+          </a:solidFill>
+        </p:spPr>
+        <p:txBody>
+          <a:bodyPr wrap="square" rtlCol="0">
+            <a:spAutoFit/>
+          </a:bodyPr>
+          <a:lstStyle/>
+          <a:p>
+            <a:pPr algn="ctr"/>
+            <a:r>
+              <a:rPr lang="en-US" dirty="0"/>
+              <a:t>Iberian connection to France is relatively weak.</a:t>
+            </a:r>
+          </a:p>
+        </p:txBody>
+      </p:sp>
+      <p:sp>
+        <p:nvSpPr>
+          <p:cNvPr id="10" name="TextBox 9">
+            <a:extLst>
+              <a:ext uri="{FF2B5EF4-FFF2-40B4-BE49-F238E27FC236}">
+                <a16:creationId xmlns:a16="http://schemas.microsoft.com/office/drawing/2014/main" id="{2C9AE285-6AA8-C2B0-0B83-F230945DFCF2}"/>
+              </a:ext>
+            </a:extLst>
+          </p:cNvPr>
+          <p:cNvSpPr txBox="1"/>
+          <p:nvPr/>
+        </p:nvSpPr>
+        <p:spPr>
+          <a:xfrm>
+            <a:off x="6951625" y="3224107"/>
+            <a:ext cx="2743201" cy="923330"/>
+          </a:xfrm>
+          <a:prstGeom prst="rect">
+            <a:avLst/>
+          </a:prstGeom>
+          <a:solidFill>
+            <a:srgbClr val="E9E9E9"/>
+          </a:solidFill>
+        </p:spPr>
+        <p:txBody>
+          <a:bodyPr wrap="square" rtlCol="0">
+            <a:spAutoFit/>
+          </a:bodyPr>
+          <a:lstStyle/>
+          <a:p>
+            <a:pPr algn="ctr"/>
+            <a:r>
+              <a:rPr lang="en-US" dirty="0"/>
+              <a:t>France, Germany, and Italy have relatively strong interchange capacity.</a:t>
+            </a:r>
+          </a:p>
+        </p:txBody>
+      </p:sp>
+    </p:spTree>
+    <p:extLst>
+      <p:ext uri="{BB962C8B-B14F-4D97-AF65-F5344CB8AC3E}">
+        <p14:creationId xmlns:p14="http://schemas.microsoft.com/office/powerpoint/2010/main" val="2798147420"/>
       </p:ext>
     </p:extLst>
   </p:cSld>
@@ -16407,401 +16120,6 @@
   <p:cSld>
     <p:spTree>
       <p:nvGrpSpPr>
-        <p:cNvPr id="1" name="">
-          <a:extLst>
-            <a:ext uri="{FF2B5EF4-FFF2-40B4-BE49-F238E27FC236}">
-              <a16:creationId xmlns:a16="http://schemas.microsoft.com/office/drawing/2014/main" id="{27A9FE06-D87F-CD98-5A22-A4614CBA6AF7}"/>
-            </a:ext>
-          </a:extLst>
-        </p:cNvPr>
-        <p:cNvGrpSpPr/>
-        <p:nvPr/>
-      </p:nvGrpSpPr>
-      <p:grpSpPr>
-        <a:xfrm>
-          <a:off x="0" y="0"/>
-          <a:ext cx="0" cy="0"/>
-          <a:chOff x="0" y="0"/>
-          <a:chExt cx="0" cy="0"/>
-        </a:xfrm>
-      </p:grpSpPr>
-      <p:sp>
-        <p:nvSpPr>
-          <p:cNvPr id="2" name="Footer Placeholder 1">
-            <a:extLst>
-              <a:ext uri="{FF2B5EF4-FFF2-40B4-BE49-F238E27FC236}">
-                <a16:creationId xmlns:a16="http://schemas.microsoft.com/office/drawing/2014/main" id="{EE0ED9DC-4971-7135-E094-41273EAD7F4C}"/>
-              </a:ext>
-            </a:extLst>
-          </p:cNvPr>
-          <p:cNvSpPr>
-            <a:spLocks noGrp="1"/>
-          </p:cNvSpPr>
-          <p:nvPr>
-            <p:ph type="ftr" sz="quarter" idx="11"/>
-          </p:nvPr>
-        </p:nvSpPr>
-        <p:spPr/>
-        <p:txBody>
-          <a:bodyPr/>
-          <a:lstStyle/>
-          <a:p>
-            <a:pPr>
-              <a:defRPr/>
-            </a:pPr>
-            <a:r>
-              <a:rPr lang="en-US"/>
-              <a:t>Apagón – April 28, 2025</a:t>
-            </a:r>
-            <a:endParaRPr lang="es-ES" dirty="0"/>
-          </a:p>
-        </p:txBody>
-      </p:sp>
-      <p:sp>
-        <p:nvSpPr>
-          <p:cNvPr id="3" name="Slide Number Placeholder 2">
-            <a:extLst>
-              <a:ext uri="{FF2B5EF4-FFF2-40B4-BE49-F238E27FC236}">
-                <a16:creationId xmlns:a16="http://schemas.microsoft.com/office/drawing/2014/main" id="{DA1AC263-A9D9-91B5-039E-B431D5DB201A}"/>
-              </a:ext>
-            </a:extLst>
-          </p:cNvPr>
-          <p:cNvSpPr>
-            <a:spLocks noGrp="1"/>
-          </p:cNvSpPr>
-          <p:nvPr>
-            <p:ph type="sldNum" sz="quarter" idx="12"/>
-          </p:nvPr>
-        </p:nvSpPr>
-        <p:spPr/>
-        <p:txBody>
-          <a:bodyPr/>
-          <a:lstStyle/>
-          <a:p>
-            <a:fld id="{F80BEE8C-9BC8-4092-9420-3642836EC31C}" type="slidenum">
-              <a:rPr lang="es-ES" altLang="es-ES" smtClean="0"/>
-              <a:pPr/>
-              <a:t>4</a:t>
-            </a:fld>
-            <a:endParaRPr lang="es-ES" altLang="es-ES"/>
-          </a:p>
-        </p:txBody>
-      </p:sp>
-      <p:pic>
-        <p:nvPicPr>
-          <p:cNvPr id="6" name="Picture 5">
-            <a:extLst>
-              <a:ext uri="{FF2B5EF4-FFF2-40B4-BE49-F238E27FC236}">
-                <a16:creationId xmlns:a16="http://schemas.microsoft.com/office/drawing/2014/main" id="{916C186E-C540-88CF-BABC-2141192D1A13}"/>
-              </a:ext>
-            </a:extLst>
-          </p:cNvPr>
-          <p:cNvPicPr>
-            <a:picLocks noChangeAspect="1"/>
-          </p:cNvPicPr>
-          <p:nvPr/>
-        </p:nvPicPr>
-        <p:blipFill>
-          <a:blip r:embed="rId2"/>
-          <a:stretch>
-            <a:fillRect/>
-          </a:stretch>
-        </p:blipFill>
-        <p:spPr>
-          <a:xfrm>
-            <a:off x="211175" y="424741"/>
-            <a:ext cx="6740450" cy="5898728"/>
-          </a:xfrm>
-          <a:prstGeom prst="rect">
-            <a:avLst/>
-          </a:prstGeom>
-        </p:spPr>
-      </p:pic>
-      <p:sp>
-        <p:nvSpPr>
-          <p:cNvPr id="7" name="TextBox 6">
-            <a:extLst>
-              <a:ext uri="{FF2B5EF4-FFF2-40B4-BE49-F238E27FC236}">
-                <a16:creationId xmlns:a16="http://schemas.microsoft.com/office/drawing/2014/main" id="{12DCF635-0D85-AB20-C537-D8700FC9D89A}"/>
-              </a:ext>
-            </a:extLst>
-          </p:cNvPr>
-          <p:cNvSpPr txBox="1"/>
-          <p:nvPr/>
-        </p:nvSpPr>
-        <p:spPr>
-          <a:xfrm>
-            <a:off x="211175" y="6538912"/>
-            <a:ext cx="3827425" cy="215444"/>
-          </a:xfrm>
-          <a:prstGeom prst="rect">
-            <a:avLst/>
-          </a:prstGeom>
-          <a:noFill/>
-        </p:spPr>
-        <p:txBody>
-          <a:bodyPr wrap="square" rtlCol="0">
-            <a:spAutoFit/>
-          </a:bodyPr>
-          <a:lstStyle/>
-          <a:p>
-            <a:r>
-              <a:rPr lang="en-US" sz="800" dirty="0"/>
-              <a:t>Source: </a:t>
-            </a:r>
-            <a:r>
-              <a:rPr lang="en-US" sz="800" dirty="0">
-                <a:hlinkClick r:id="rId3"/>
-              </a:rPr>
-              <a:t>El Pais, “</a:t>
-            </a:r>
-            <a:r>
-              <a:rPr lang="en-US" sz="800" b="1" i="0" dirty="0">
-                <a:solidFill>
-                  <a:srgbClr val="111111"/>
-                </a:solidFill>
-                <a:effectLst/>
-                <a:latin typeface="MajritTx"/>
-                <a:hlinkClick r:id="rId3"/>
-              </a:rPr>
-              <a:t>¿</a:t>
-            </a:r>
-            <a:r>
-              <a:rPr lang="en-US" sz="800" b="1" i="0" dirty="0" err="1">
-                <a:solidFill>
-                  <a:srgbClr val="111111"/>
-                </a:solidFill>
-                <a:effectLst/>
-                <a:latin typeface="MajritTx"/>
-                <a:hlinkClick r:id="rId3"/>
-              </a:rPr>
-              <a:t>Qué</a:t>
-            </a:r>
-            <a:r>
-              <a:rPr lang="en-US" sz="800" b="1" i="0" dirty="0">
-                <a:solidFill>
-                  <a:srgbClr val="111111"/>
-                </a:solidFill>
-                <a:effectLst/>
-                <a:latin typeface="MajritTx"/>
-                <a:hlinkClick r:id="rId3"/>
-              </a:rPr>
-              <a:t> </a:t>
-            </a:r>
-            <a:r>
-              <a:rPr lang="en-US" sz="800" b="1" i="0" dirty="0" err="1">
-                <a:solidFill>
-                  <a:srgbClr val="111111"/>
-                </a:solidFill>
-                <a:effectLst/>
-                <a:latin typeface="MajritTx"/>
-                <a:hlinkClick r:id="rId3"/>
-              </a:rPr>
-              <a:t>causó</a:t>
-            </a:r>
-            <a:r>
-              <a:rPr lang="en-US" sz="800" b="1" i="0" dirty="0">
-                <a:solidFill>
-                  <a:srgbClr val="111111"/>
-                </a:solidFill>
-                <a:effectLst/>
-                <a:latin typeface="MajritTx"/>
-                <a:hlinkClick r:id="rId3"/>
-              </a:rPr>
-              <a:t> </a:t>
-            </a:r>
-            <a:r>
-              <a:rPr lang="en-US" sz="800" b="1" i="0" dirty="0" err="1">
-                <a:solidFill>
-                  <a:srgbClr val="111111"/>
-                </a:solidFill>
-                <a:effectLst/>
-                <a:latin typeface="MajritTx"/>
-                <a:hlinkClick r:id="rId3"/>
-              </a:rPr>
-              <a:t>el</a:t>
-            </a:r>
-            <a:r>
-              <a:rPr lang="en-US" sz="800" b="1" i="0" dirty="0">
-                <a:solidFill>
-                  <a:srgbClr val="111111"/>
-                </a:solidFill>
-                <a:effectLst/>
-                <a:latin typeface="MajritTx"/>
-                <a:hlinkClick r:id="rId3"/>
-              </a:rPr>
-              <a:t> </a:t>
-            </a:r>
-            <a:r>
-              <a:rPr lang="en-US" sz="800" b="1" i="0" dirty="0" err="1">
-                <a:solidFill>
-                  <a:srgbClr val="111111"/>
-                </a:solidFill>
-                <a:effectLst/>
-                <a:latin typeface="MajritTx"/>
-                <a:hlinkClick r:id="rId3"/>
-              </a:rPr>
-              <a:t>apagón</a:t>
-            </a:r>
-            <a:r>
-              <a:rPr lang="en-US" sz="800" b="1" i="0" dirty="0">
-                <a:solidFill>
-                  <a:srgbClr val="111111"/>
-                </a:solidFill>
-                <a:effectLst/>
-                <a:latin typeface="MajritTx"/>
-                <a:hlinkClick r:id="rId3"/>
-              </a:rPr>
-              <a:t>? </a:t>
-            </a:r>
-            <a:r>
-              <a:rPr lang="en-US" sz="800" b="1" i="0" dirty="0" err="1">
-                <a:solidFill>
-                  <a:srgbClr val="111111"/>
-                </a:solidFill>
-                <a:effectLst/>
-                <a:latin typeface="MajritTx"/>
-                <a:hlinkClick r:id="rId3"/>
-              </a:rPr>
-              <a:t>Explicación</a:t>
-            </a:r>
-            <a:r>
-              <a:rPr lang="en-US" sz="800" b="1" i="0" dirty="0">
-                <a:solidFill>
-                  <a:srgbClr val="111111"/>
-                </a:solidFill>
-                <a:effectLst/>
-                <a:latin typeface="MajritTx"/>
-                <a:hlinkClick r:id="rId3"/>
-              </a:rPr>
-              <a:t> visual y breve de lo que </a:t>
-            </a:r>
-            <a:r>
-              <a:rPr lang="en-US" sz="800" b="1" i="0" dirty="0" err="1">
-                <a:solidFill>
-                  <a:srgbClr val="111111"/>
-                </a:solidFill>
-                <a:effectLst/>
-                <a:latin typeface="MajritTx"/>
-                <a:hlinkClick r:id="rId3"/>
-              </a:rPr>
-              <a:t>sabemos</a:t>
-            </a:r>
-            <a:r>
-              <a:rPr lang="en-US" sz="800" b="1" i="0" dirty="0">
-                <a:solidFill>
-                  <a:srgbClr val="111111"/>
-                </a:solidFill>
-                <a:effectLst/>
-                <a:latin typeface="MajritTx"/>
-                <a:hlinkClick r:id="rId3"/>
-              </a:rPr>
-              <a:t>”</a:t>
-            </a:r>
-            <a:endParaRPr lang="en-US" sz="800" b="1" i="0" dirty="0">
-              <a:solidFill>
-                <a:srgbClr val="111111"/>
-              </a:solidFill>
-              <a:effectLst/>
-              <a:latin typeface="MajritTx"/>
-            </a:endParaRPr>
-          </a:p>
-        </p:txBody>
-      </p:sp>
-      <p:sp>
-        <p:nvSpPr>
-          <p:cNvPr id="9" name="TextBox 8">
-            <a:extLst>
-              <a:ext uri="{FF2B5EF4-FFF2-40B4-BE49-F238E27FC236}">
-                <a16:creationId xmlns:a16="http://schemas.microsoft.com/office/drawing/2014/main" id="{067C6305-2230-D18D-FB7A-A3EE39A6C58A}"/>
-              </a:ext>
-            </a:extLst>
-          </p:cNvPr>
-          <p:cNvSpPr txBox="1"/>
-          <p:nvPr/>
-        </p:nvSpPr>
-        <p:spPr>
-          <a:xfrm>
-            <a:off x="6951625" y="4483632"/>
-            <a:ext cx="2743201" cy="646331"/>
-          </a:xfrm>
-          <a:prstGeom prst="rect">
-            <a:avLst/>
-          </a:prstGeom>
-          <a:solidFill>
-            <a:srgbClr val="E9E9E9"/>
-          </a:solidFill>
-        </p:spPr>
-        <p:txBody>
-          <a:bodyPr wrap="square" rtlCol="0">
-            <a:spAutoFit/>
-          </a:bodyPr>
-          <a:lstStyle/>
-          <a:p>
-            <a:pPr algn="ctr"/>
-            <a:r>
-              <a:rPr lang="en-US" dirty="0"/>
-              <a:t>Iberian connection to France is relatively weak.</a:t>
-            </a:r>
-          </a:p>
-        </p:txBody>
-      </p:sp>
-      <p:sp>
-        <p:nvSpPr>
-          <p:cNvPr id="10" name="TextBox 9">
-            <a:extLst>
-              <a:ext uri="{FF2B5EF4-FFF2-40B4-BE49-F238E27FC236}">
-                <a16:creationId xmlns:a16="http://schemas.microsoft.com/office/drawing/2014/main" id="{2C9AE285-6AA8-C2B0-0B83-F230945DFCF2}"/>
-              </a:ext>
-            </a:extLst>
-          </p:cNvPr>
-          <p:cNvSpPr txBox="1"/>
-          <p:nvPr/>
-        </p:nvSpPr>
-        <p:spPr>
-          <a:xfrm>
-            <a:off x="6951625" y="3224107"/>
-            <a:ext cx="2743201" cy="923330"/>
-          </a:xfrm>
-          <a:prstGeom prst="rect">
-            <a:avLst/>
-          </a:prstGeom>
-          <a:solidFill>
-            <a:srgbClr val="E9E9E9"/>
-          </a:solidFill>
-        </p:spPr>
-        <p:txBody>
-          <a:bodyPr wrap="square" rtlCol="0">
-            <a:spAutoFit/>
-          </a:bodyPr>
-          <a:lstStyle/>
-          <a:p>
-            <a:pPr algn="ctr"/>
-            <a:r>
-              <a:rPr lang="en-US" dirty="0"/>
-              <a:t>France, Germany, and Italy have relatively strong interchange capacity.</a:t>
-            </a:r>
-          </a:p>
-        </p:txBody>
-      </p:sp>
-    </p:spTree>
-    <p:extLst>
-      <p:ext uri="{BB962C8B-B14F-4D97-AF65-F5344CB8AC3E}">
-        <p14:creationId xmlns:p14="http://schemas.microsoft.com/office/powerpoint/2010/main" val="2798147420"/>
-      </p:ext>
-    </p:extLst>
-  </p:cSld>
-  <p:clrMapOvr>
-    <a:masterClrMapping/>
-  </p:clrMapOvr>
-</p:sld>
-</file>
-
-<file path=ppt/slides/slide5.xml><?xml version="1.0" encoding="utf-8"?>
-<p:sld xmlns:a="http://schemas.openxmlformats.org/drawingml/2006/main" xmlns:r="http://schemas.openxmlformats.org/officeDocument/2006/relationships" xmlns:p="http://schemas.openxmlformats.org/presentationml/2006/main">
-  <p:cSld>
-    <p:spTree>
-      <p:nvGrpSpPr>
         <p:cNvPr id="1" name=""/>
         <p:cNvGrpSpPr/>
         <p:nvPr/>
@@ -16935,7 +16253,7 @@
             <a:fld id="{D86B3D54-5C84-4380-B90C-31F636633DA2}" type="slidenum">
               <a:rPr lang="es-ES" altLang="es-ES" smtClean="0"/>
               <a:pPr/>
-              <a:t>5</a:t>
+              <a:t>4</a:t>
             </a:fld>
             <a:endParaRPr lang="es-ES" altLang="es-ES"/>
           </a:p>
@@ -17807,7 +17125,7 @@
 </p:sld>
 </file>
 
-<file path=ppt/slides/slide6.xml><?xml version="1.0" encoding="utf-8"?>
+<file path=ppt/slides/slide5.xml><?xml version="1.0" encoding="utf-8"?>
 <p:sld xmlns:a="http://schemas.openxmlformats.org/drawingml/2006/main" xmlns:r="http://schemas.openxmlformats.org/officeDocument/2006/relationships" xmlns:p="http://schemas.openxmlformats.org/presentationml/2006/main">
   <p:cSld>
     <p:spTree>
@@ -17887,7 +17205,7 @@
             <a:fld id="{D86B3D54-5C84-4380-B90C-31F636633DA2}" type="slidenum">
               <a:rPr lang="es-ES" altLang="es-ES" smtClean="0"/>
               <a:pPr/>
-              <a:t>6</a:t>
+              <a:t>5</a:t>
             </a:fld>
             <a:endParaRPr lang="es-ES" altLang="es-ES"/>
           </a:p>
@@ -18375,7 +17693,7 @@
 </p:sld>
 </file>
 
-<file path=ppt/slides/slide7.xml><?xml version="1.0" encoding="utf-8"?>
+<file path=ppt/slides/slide6.xml><?xml version="1.0" encoding="utf-8"?>
 <p:sld xmlns:a="http://schemas.openxmlformats.org/drawingml/2006/main" xmlns:r="http://schemas.openxmlformats.org/officeDocument/2006/relationships" xmlns:p="http://schemas.openxmlformats.org/presentationml/2006/main">
   <p:cSld>
     <p:spTree>
@@ -18452,7 +17770,7 @@
             <a:fld id="{D86B3D54-5C84-4380-B90C-31F636633DA2}" type="slidenum">
               <a:rPr lang="es-ES" altLang="es-ES" smtClean="0"/>
               <a:pPr/>
-              <a:t>7</a:t>
+              <a:t>6</a:t>
             </a:fld>
             <a:endParaRPr lang="es-ES" altLang="es-ES"/>
           </a:p>
@@ -18700,7 +18018,7 @@
 </p:sld>
 </file>
 
-<file path=ppt/slides/slide8.xml><?xml version="1.0" encoding="utf-8"?>
+<file path=ppt/slides/slide7.xml><?xml version="1.0" encoding="utf-8"?>
 <p:sld xmlns:a="http://schemas.openxmlformats.org/drawingml/2006/main" xmlns:r="http://schemas.openxmlformats.org/officeDocument/2006/relationships" xmlns:p="http://schemas.openxmlformats.org/presentationml/2006/main">
   <p:cSld>
     <p:spTree>
@@ -18777,7 +18095,7 @@
             <a:fld id="{D86B3D54-5C84-4380-B90C-31F636633DA2}" type="slidenum">
               <a:rPr lang="es-ES" altLang="es-ES" smtClean="0"/>
               <a:pPr/>
-              <a:t>8</a:t>
+              <a:t>7</a:t>
             </a:fld>
             <a:endParaRPr lang="es-ES" altLang="es-ES"/>
           </a:p>
@@ -19118,7 +18436,7 @@
 </p:sld>
 </file>
 
-<file path=ppt/slides/slide9.xml><?xml version="1.0" encoding="utf-8"?>
+<file path=ppt/slides/slide8.xml><?xml version="1.0" encoding="utf-8"?>
 <p:sld xmlns:a="http://schemas.openxmlformats.org/drawingml/2006/main" xmlns:r="http://schemas.openxmlformats.org/officeDocument/2006/relationships" xmlns:p="http://schemas.openxmlformats.org/presentationml/2006/main">
   <p:cSld>
     <p:spTree>
@@ -19195,7 +18513,7 @@
             <a:fld id="{D86B3D54-5C84-4380-B90C-31F636633DA2}" type="slidenum">
               <a:rPr lang="es-ES" altLang="es-ES" smtClean="0"/>
               <a:pPr/>
-              <a:t>9</a:t>
+              <a:t>8</a:t>
             </a:fld>
             <a:endParaRPr lang="es-ES" altLang="es-ES"/>
           </a:p>
@@ -19879,6 +19197,688 @@
     <p:extLst>
       <p:ext uri="{BB962C8B-B14F-4D97-AF65-F5344CB8AC3E}">
         <p14:creationId xmlns:p14="http://schemas.microsoft.com/office/powerpoint/2010/main" val="2874622929"/>
+      </p:ext>
+    </p:extLst>
+  </p:cSld>
+  <p:clrMapOvr>
+    <a:masterClrMapping/>
+  </p:clrMapOvr>
+</p:sld>
+</file>
+
+<file path=ppt/slides/slide9.xml><?xml version="1.0" encoding="utf-8"?>
+<p:sld xmlns:a="http://schemas.openxmlformats.org/drawingml/2006/main" xmlns:r="http://schemas.openxmlformats.org/officeDocument/2006/relationships" xmlns:p="http://schemas.openxmlformats.org/presentationml/2006/main">
+  <p:cSld>
+    <p:spTree>
+      <p:nvGrpSpPr>
+        <p:cNvPr id="1" name="">
+          <a:extLst>
+            <a:ext uri="{FF2B5EF4-FFF2-40B4-BE49-F238E27FC236}">
+              <a16:creationId xmlns:a16="http://schemas.microsoft.com/office/drawing/2014/main" id="{C0A527B7-B1D5-0298-CCB2-AF3DBB000A33}"/>
+            </a:ext>
+          </a:extLst>
+        </p:cNvPr>
+        <p:cNvGrpSpPr/>
+        <p:nvPr/>
+      </p:nvGrpSpPr>
+      <p:grpSpPr>
+        <a:xfrm>
+          <a:off x="0" y="0"/>
+          <a:ext cx="0" cy="0"/>
+          <a:chOff x="0" y="0"/>
+          <a:chExt cx="0" cy="0"/>
+        </a:xfrm>
+      </p:grpSpPr>
+      <p:sp>
+        <p:nvSpPr>
+          <p:cNvPr id="7" name="Paralelogramo 6">
+            <a:extLst>
+              <a:ext uri="{FF2B5EF4-FFF2-40B4-BE49-F238E27FC236}">
+                <a16:creationId xmlns:a16="http://schemas.microsoft.com/office/drawing/2014/main" id="{F6545BFE-BB10-8421-40F3-000D4C50A5F6}"/>
+              </a:ext>
+            </a:extLst>
+          </p:cNvPr>
+          <p:cNvSpPr/>
+          <p:nvPr/>
+        </p:nvSpPr>
+        <p:spPr>
+          <a:xfrm flipH="1">
+            <a:off x="0" y="0"/>
+            <a:ext cx="5527675" cy="6858000"/>
+          </a:xfrm>
+          <a:prstGeom prst="parallelogram">
+            <a:avLst/>
+          </a:prstGeom>
+          <a:solidFill>
+            <a:srgbClr val="FFCC28"/>
+          </a:solidFill>
+          <a:ln>
+            <a:noFill/>
+          </a:ln>
+        </p:spPr>
+        <p:style>
+          <a:lnRef idx="2">
+            <a:schemeClr val="accent1">
+              <a:shade val="50000"/>
+            </a:schemeClr>
+          </a:lnRef>
+          <a:fillRef idx="1">
+            <a:schemeClr val="accent1"/>
+          </a:fillRef>
+          <a:effectRef idx="0">
+            <a:schemeClr val="accent1"/>
+          </a:effectRef>
+          <a:fontRef idx="minor">
+            <a:schemeClr val="lt1"/>
+          </a:fontRef>
+        </p:style>
+        <p:txBody>
+          <a:bodyPr anchor="ctr"/>
+          <a:lstStyle/>
+          <a:p>
+            <a:pPr algn="ctr" eaLnBrk="1" fontAlgn="auto" hangingPunct="1">
+              <a:spcBef>
+                <a:spcPts val="0"/>
+              </a:spcBef>
+              <a:spcAft>
+                <a:spcPts val="0"/>
+              </a:spcAft>
+              <a:defRPr/>
+            </a:pPr>
+            <a:endParaRPr lang="es-ES">
+              <a:latin typeface="Cabin Regular" pitchFamily="2" charset="77"/>
+            </a:endParaRPr>
+          </a:p>
+        </p:txBody>
+      </p:sp>
+      <p:sp>
+        <p:nvSpPr>
+          <p:cNvPr id="3" name="Marcador de número de diapositiva 2">
+            <a:extLst>
+              <a:ext uri="{FF2B5EF4-FFF2-40B4-BE49-F238E27FC236}">
+                <a16:creationId xmlns:a16="http://schemas.microsoft.com/office/drawing/2014/main" id="{A9B32B6B-286D-B587-85B4-1FC507B9E343}"/>
+              </a:ext>
+            </a:extLst>
+          </p:cNvPr>
+          <p:cNvSpPr>
+            <a:spLocks noGrp="1"/>
+          </p:cNvSpPr>
+          <p:nvPr>
+            <p:ph type="sldNum" sz="quarter" idx="12"/>
+          </p:nvPr>
+        </p:nvSpPr>
+        <p:spPr/>
+        <p:txBody>
+          <a:bodyPr/>
+          <a:lstStyle>
+            <a:lvl1pPr>
+              <a:defRPr>
+                <a:solidFill>
+                  <a:schemeClr val="tx1"/>
+                </a:solidFill>
+                <a:latin typeface="Calibri" panose="020F0502020204030204" pitchFamily="34" charset="0"/>
+              </a:defRPr>
+            </a:lvl1pPr>
+            <a:lvl2pPr marL="742950" indent="-285750">
+              <a:defRPr>
+                <a:solidFill>
+                  <a:schemeClr val="tx1"/>
+                </a:solidFill>
+                <a:latin typeface="Calibri" panose="020F0502020204030204" pitchFamily="34" charset="0"/>
+              </a:defRPr>
+            </a:lvl2pPr>
+            <a:lvl3pPr marL="1143000" indent="-228600">
+              <a:defRPr>
+                <a:solidFill>
+                  <a:schemeClr val="tx1"/>
+                </a:solidFill>
+                <a:latin typeface="Calibri" panose="020F0502020204030204" pitchFamily="34" charset="0"/>
+              </a:defRPr>
+            </a:lvl3pPr>
+            <a:lvl4pPr marL="1600200" indent="-228600">
+              <a:defRPr>
+                <a:solidFill>
+                  <a:schemeClr val="tx1"/>
+                </a:solidFill>
+                <a:latin typeface="Calibri" panose="020F0502020204030204" pitchFamily="34" charset="0"/>
+              </a:defRPr>
+            </a:lvl4pPr>
+            <a:lvl5pPr marL="2057400" indent="-228600">
+              <a:defRPr>
+                <a:solidFill>
+                  <a:schemeClr val="tx1"/>
+                </a:solidFill>
+                <a:latin typeface="Calibri" panose="020F0502020204030204" pitchFamily="34" charset="0"/>
+              </a:defRPr>
+            </a:lvl5pPr>
+            <a:lvl6pPr marL="2514600" indent="-228600" fontAlgn="base">
+              <a:spcBef>
+                <a:spcPct val="0"/>
+              </a:spcBef>
+              <a:spcAft>
+                <a:spcPct val="0"/>
+              </a:spcAft>
+              <a:defRPr>
+                <a:solidFill>
+                  <a:schemeClr val="tx1"/>
+                </a:solidFill>
+                <a:latin typeface="Calibri" panose="020F0502020204030204" pitchFamily="34" charset="0"/>
+              </a:defRPr>
+            </a:lvl6pPr>
+            <a:lvl7pPr marL="2971800" indent="-228600" fontAlgn="base">
+              <a:spcBef>
+                <a:spcPct val="0"/>
+              </a:spcBef>
+              <a:spcAft>
+                <a:spcPct val="0"/>
+              </a:spcAft>
+              <a:defRPr>
+                <a:solidFill>
+                  <a:schemeClr val="tx1"/>
+                </a:solidFill>
+                <a:latin typeface="Calibri" panose="020F0502020204030204" pitchFamily="34" charset="0"/>
+              </a:defRPr>
+            </a:lvl7pPr>
+            <a:lvl8pPr marL="3429000" indent="-228600" fontAlgn="base">
+              <a:spcBef>
+                <a:spcPct val="0"/>
+              </a:spcBef>
+              <a:spcAft>
+                <a:spcPct val="0"/>
+              </a:spcAft>
+              <a:defRPr>
+                <a:solidFill>
+                  <a:schemeClr val="tx1"/>
+                </a:solidFill>
+                <a:latin typeface="Calibri" panose="020F0502020204030204" pitchFamily="34" charset="0"/>
+              </a:defRPr>
+            </a:lvl8pPr>
+            <a:lvl9pPr marL="3886200" indent="-228600" fontAlgn="base">
+              <a:spcBef>
+                <a:spcPct val="0"/>
+              </a:spcBef>
+              <a:spcAft>
+                <a:spcPct val="0"/>
+              </a:spcAft>
+              <a:defRPr>
+                <a:solidFill>
+                  <a:schemeClr val="tx1"/>
+                </a:solidFill>
+                <a:latin typeface="Calibri" panose="020F0502020204030204" pitchFamily="34" charset="0"/>
+              </a:defRPr>
+            </a:lvl9pPr>
+          </a:lstStyle>
+          <a:p>
+            <a:fld id="{75AE09BB-B6BF-466C-9F64-2188A5A41A10}" type="slidenum">
+              <a:rPr lang="es-ES" altLang="es-ES">
+                <a:solidFill>
+                  <a:srgbClr val="898989"/>
+                </a:solidFill>
+                <a:latin typeface="Cabin Regular" pitchFamily="2" charset="0"/>
+              </a:rPr>
+              <a:pPr/>
+              <a:t>9</a:t>
+            </a:fld>
+            <a:endParaRPr lang="es-ES" altLang="es-ES">
+              <a:solidFill>
+                <a:srgbClr val="898989"/>
+              </a:solidFill>
+              <a:latin typeface="Cabin Regular" pitchFamily="2" charset="0"/>
+            </a:endParaRPr>
+          </a:p>
+        </p:txBody>
+      </p:sp>
+      <p:sp>
+        <p:nvSpPr>
+          <p:cNvPr id="4" name="CuadroTexto 3">
+            <a:extLst>
+              <a:ext uri="{FF2B5EF4-FFF2-40B4-BE49-F238E27FC236}">
+                <a16:creationId xmlns:a16="http://schemas.microsoft.com/office/drawing/2014/main" id="{E3D53BAC-3FFA-7F26-0128-B8726748F888}"/>
+              </a:ext>
+            </a:extLst>
+          </p:cNvPr>
+          <p:cNvSpPr txBox="1"/>
+          <p:nvPr/>
+        </p:nvSpPr>
+        <p:spPr>
+          <a:xfrm>
+            <a:off x="2252664" y="2787650"/>
+            <a:ext cx="8778860" cy="646331"/>
+          </a:xfrm>
+          <a:prstGeom prst="rect">
+            <a:avLst/>
+          </a:prstGeom>
+          <a:noFill/>
+        </p:spPr>
+        <p:txBody>
+          <a:bodyPr wrap="square">
+            <a:spAutoFit/>
+          </a:bodyPr>
+          <a:lstStyle/>
+          <a:p>
+            <a:pPr eaLnBrk="1" fontAlgn="auto" hangingPunct="1">
+              <a:spcBef>
+                <a:spcPts val="0"/>
+              </a:spcBef>
+              <a:spcAft>
+                <a:spcPts val="0"/>
+              </a:spcAft>
+              <a:defRPr/>
+            </a:pPr>
+            <a:r>
+              <a:rPr lang="es-ES" sz="3600" b="1" spc="300" dirty="0" err="1">
+                <a:latin typeface="Open Sans Extrabold" panose="020B0606030504020204" pitchFamily="34" charset="0"/>
+                <a:ea typeface="Open Sans Extrabold" panose="020B0606030504020204" pitchFamily="34" charset="0"/>
+                <a:cs typeface="Open Sans Extrabold" panose="020B0606030504020204" pitchFamily="34" charset="0"/>
+              </a:rPr>
+              <a:t>Rate</a:t>
+            </a:r>
+            <a:r>
+              <a:rPr lang="es-ES" sz="3600" b="1" spc="300" dirty="0">
+                <a:latin typeface="Open Sans Extrabold" panose="020B0606030504020204" pitchFamily="34" charset="0"/>
+                <a:ea typeface="Open Sans Extrabold" panose="020B0606030504020204" pitchFamily="34" charset="0"/>
+                <a:cs typeface="Open Sans Extrabold" panose="020B0606030504020204" pitchFamily="34" charset="0"/>
+              </a:rPr>
+              <a:t> </a:t>
+            </a:r>
+            <a:r>
+              <a:rPr lang="es-ES" sz="3600" b="1" spc="300" dirty="0" err="1">
+                <a:latin typeface="Open Sans Extrabold" panose="020B0606030504020204" pitchFamily="34" charset="0"/>
+                <a:ea typeface="Open Sans Extrabold" panose="020B0606030504020204" pitchFamily="34" charset="0"/>
+                <a:cs typeface="Open Sans Extrabold" panose="020B0606030504020204" pitchFamily="34" charset="0"/>
+              </a:rPr>
+              <a:t>of</a:t>
+            </a:r>
+            <a:r>
+              <a:rPr lang="es-ES" sz="3600" b="1" spc="300" dirty="0">
+                <a:latin typeface="Open Sans Extrabold" panose="020B0606030504020204" pitchFamily="34" charset="0"/>
+                <a:ea typeface="Open Sans Extrabold" panose="020B0606030504020204" pitchFamily="34" charset="0"/>
+                <a:cs typeface="Open Sans Extrabold" panose="020B0606030504020204" pitchFamily="34" charset="0"/>
+              </a:rPr>
+              <a:t> Change </a:t>
+            </a:r>
+            <a:r>
+              <a:rPr lang="es-ES" sz="3600" b="1" spc="300" dirty="0" err="1">
+                <a:latin typeface="Open Sans Extrabold" panose="020B0606030504020204" pitchFamily="34" charset="0"/>
+                <a:ea typeface="Open Sans Extrabold" panose="020B0606030504020204" pitchFamily="34" charset="0"/>
+                <a:cs typeface="Open Sans Extrabold" panose="020B0606030504020204" pitchFamily="34" charset="0"/>
+              </a:rPr>
+              <a:t>of</a:t>
+            </a:r>
+            <a:r>
+              <a:rPr lang="es-ES" sz="3600" b="1" spc="300" dirty="0">
+                <a:latin typeface="Open Sans Extrabold" panose="020B0606030504020204" pitchFamily="34" charset="0"/>
+                <a:ea typeface="Open Sans Extrabold" panose="020B0606030504020204" pitchFamily="34" charset="0"/>
+                <a:cs typeface="Open Sans Extrabold" panose="020B0606030504020204" pitchFamily="34" charset="0"/>
+              </a:rPr>
+              <a:t> </a:t>
+            </a:r>
+            <a:r>
+              <a:rPr lang="es-ES" sz="3600" b="1" spc="300" dirty="0" err="1">
+                <a:latin typeface="Open Sans Extrabold" panose="020B0606030504020204" pitchFamily="34" charset="0"/>
+                <a:ea typeface="Open Sans Extrabold" panose="020B0606030504020204" pitchFamily="34" charset="0"/>
+                <a:cs typeface="Open Sans Extrabold" panose="020B0606030504020204" pitchFamily="34" charset="0"/>
+              </a:rPr>
+              <a:t>Frequency</a:t>
+            </a:r>
+            <a:endParaRPr lang="es-ES" dirty="0">
+              <a:latin typeface="Cabin Regular" pitchFamily="2" charset="77"/>
+            </a:endParaRPr>
+          </a:p>
+        </p:txBody>
+      </p:sp>
+      <p:sp>
+        <p:nvSpPr>
+          <p:cNvPr id="5" name="Rectángulo 4">
+            <a:extLst>
+              <a:ext uri="{FF2B5EF4-FFF2-40B4-BE49-F238E27FC236}">
+                <a16:creationId xmlns:a16="http://schemas.microsoft.com/office/drawing/2014/main" id="{168594E2-CA84-BB04-DF14-402D08E95ED9}"/>
+              </a:ext>
+            </a:extLst>
+          </p:cNvPr>
+          <p:cNvSpPr/>
+          <p:nvPr/>
+        </p:nvSpPr>
+        <p:spPr>
+          <a:xfrm flipV="1">
+            <a:off x="8097838" y="3527425"/>
+            <a:ext cx="1751012" cy="46038"/>
+          </a:xfrm>
+          <a:prstGeom prst="rect">
+            <a:avLst/>
+          </a:prstGeom>
+          <a:solidFill>
+            <a:srgbClr val="FFCC28"/>
+          </a:solidFill>
+          <a:ln>
+            <a:noFill/>
+          </a:ln>
+        </p:spPr>
+        <p:style>
+          <a:lnRef idx="2">
+            <a:schemeClr val="accent1">
+              <a:shade val="50000"/>
+            </a:schemeClr>
+          </a:lnRef>
+          <a:fillRef idx="1">
+            <a:schemeClr val="accent1"/>
+          </a:fillRef>
+          <a:effectRef idx="0">
+            <a:schemeClr val="accent1"/>
+          </a:effectRef>
+          <a:fontRef idx="minor">
+            <a:schemeClr val="lt1"/>
+          </a:fontRef>
+        </p:style>
+        <p:txBody>
+          <a:bodyPr anchor="ctr"/>
+          <a:lstStyle/>
+          <a:p>
+            <a:pPr algn="ctr" eaLnBrk="1" fontAlgn="auto" hangingPunct="1">
+              <a:spcBef>
+                <a:spcPts val="0"/>
+              </a:spcBef>
+              <a:spcAft>
+                <a:spcPts val="0"/>
+              </a:spcAft>
+              <a:defRPr/>
+            </a:pPr>
+            <a:endParaRPr lang="es-ES">
+              <a:latin typeface="Cabin Regular" pitchFamily="2" charset="77"/>
+            </a:endParaRPr>
+          </a:p>
+        </p:txBody>
+      </p:sp>
+      <p:sp>
+        <p:nvSpPr>
+          <p:cNvPr id="54278" name="CuadroTexto 5">
+            <a:extLst>
+              <a:ext uri="{FF2B5EF4-FFF2-40B4-BE49-F238E27FC236}">
+                <a16:creationId xmlns:a16="http://schemas.microsoft.com/office/drawing/2014/main" id="{8C66E389-97E8-D9A6-F827-56CF5DF959F5}"/>
+              </a:ext>
+            </a:extLst>
+          </p:cNvPr>
+          <p:cNvSpPr txBox="1">
+            <a:spLocks noChangeArrowheads="1"/>
+          </p:cNvSpPr>
+          <p:nvPr/>
+        </p:nvSpPr>
+        <p:spPr bwMode="auto">
+          <a:xfrm>
+            <a:off x="2252663" y="2308225"/>
+            <a:ext cx="3937000" cy="369888"/>
+          </a:xfrm>
+          <a:prstGeom prst="rect">
+            <a:avLst/>
+          </a:prstGeom>
+          <a:noFill/>
+          <a:ln>
+            <a:noFill/>
+          </a:ln>
+          <a:extLst>
+            <a:ext uri="{909E8E84-426E-40DD-AFC4-6F175D3DCCD1}">
+              <a14:hiddenFill xmlns:a14="http://schemas.microsoft.com/office/drawing/2010/main">
+                <a:solidFill>
+                  <a:srgbClr val="FFFFFF"/>
+                </a:solidFill>
+              </a14:hiddenFill>
+            </a:ext>
+            <a:ext uri="{91240B29-F687-4F45-9708-019B960494DF}">
+              <a14:hiddenLine xmlns:a14="http://schemas.microsoft.com/office/drawing/2010/main" w="9525">
+                <a:solidFill>
+                  <a:srgbClr val="000000"/>
+                </a:solidFill>
+                <a:miter lim="800000"/>
+                <a:headEnd/>
+                <a:tailEnd/>
+              </a14:hiddenLine>
+            </a:ext>
+          </a:extLst>
+        </p:spPr>
+        <p:txBody>
+          <a:bodyPr>
+            <a:spAutoFit/>
+          </a:bodyPr>
+          <a:lstStyle>
+            <a:lvl1pPr>
+              <a:defRPr>
+                <a:solidFill>
+                  <a:schemeClr val="tx1"/>
+                </a:solidFill>
+                <a:latin typeface="Calibri" panose="020F0502020204030204" pitchFamily="34" charset="0"/>
+              </a:defRPr>
+            </a:lvl1pPr>
+            <a:lvl2pPr marL="742950" indent="-285750">
+              <a:defRPr>
+                <a:solidFill>
+                  <a:schemeClr val="tx1"/>
+                </a:solidFill>
+                <a:latin typeface="Calibri" panose="020F0502020204030204" pitchFamily="34" charset="0"/>
+              </a:defRPr>
+            </a:lvl2pPr>
+            <a:lvl3pPr marL="1143000" indent="-228600">
+              <a:defRPr>
+                <a:solidFill>
+                  <a:schemeClr val="tx1"/>
+                </a:solidFill>
+                <a:latin typeface="Calibri" panose="020F0502020204030204" pitchFamily="34" charset="0"/>
+              </a:defRPr>
+            </a:lvl3pPr>
+            <a:lvl4pPr marL="1600200" indent="-228600">
+              <a:defRPr>
+                <a:solidFill>
+                  <a:schemeClr val="tx1"/>
+                </a:solidFill>
+                <a:latin typeface="Calibri" panose="020F0502020204030204" pitchFamily="34" charset="0"/>
+              </a:defRPr>
+            </a:lvl4pPr>
+            <a:lvl5pPr marL="2057400" indent="-228600">
+              <a:defRPr>
+                <a:solidFill>
+                  <a:schemeClr val="tx1"/>
+                </a:solidFill>
+                <a:latin typeface="Calibri" panose="020F0502020204030204" pitchFamily="34" charset="0"/>
+              </a:defRPr>
+            </a:lvl5pPr>
+            <a:lvl6pPr marL="2514600" indent="-228600" fontAlgn="base">
+              <a:spcBef>
+                <a:spcPct val="0"/>
+              </a:spcBef>
+              <a:spcAft>
+                <a:spcPct val="0"/>
+              </a:spcAft>
+              <a:defRPr>
+                <a:solidFill>
+                  <a:schemeClr val="tx1"/>
+                </a:solidFill>
+                <a:latin typeface="Calibri" panose="020F0502020204030204" pitchFamily="34" charset="0"/>
+              </a:defRPr>
+            </a:lvl6pPr>
+            <a:lvl7pPr marL="2971800" indent="-228600" fontAlgn="base">
+              <a:spcBef>
+                <a:spcPct val="0"/>
+              </a:spcBef>
+              <a:spcAft>
+                <a:spcPct val="0"/>
+              </a:spcAft>
+              <a:defRPr>
+                <a:solidFill>
+                  <a:schemeClr val="tx1"/>
+                </a:solidFill>
+                <a:latin typeface="Calibri" panose="020F0502020204030204" pitchFamily="34" charset="0"/>
+              </a:defRPr>
+            </a:lvl7pPr>
+            <a:lvl8pPr marL="3429000" indent="-228600" fontAlgn="base">
+              <a:spcBef>
+                <a:spcPct val="0"/>
+              </a:spcBef>
+              <a:spcAft>
+                <a:spcPct val="0"/>
+              </a:spcAft>
+              <a:defRPr>
+                <a:solidFill>
+                  <a:schemeClr val="tx1"/>
+                </a:solidFill>
+                <a:latin typeface="Calibri" panose="020F0502020204030204" pitchFamily="34" charset="0"/>
+              </a:defRPr>
+            </a:lvl8pPr>
+            <a:lvl9pPr marL="3886200" indent="-228600" fontAlgn="base">
+              <a:spcBef>
+                <a:spcPct val="0"/>
+              </a:spcBef>
+              <a:spcAft>
+                <a:spcPct val="0"/>
+              </a:spcAft>
+              <a:defRPr>
+                <a:solidFill>
+                  <a:schemeClr val="tx1"/>
+                </a:solidFill>
+                <a:latin typeface="Calibri" panose="020F0502020204030204" pitchFamily="34" charset="0"/>
+              </a:defRPr>
+            </a:lvl9pPr>
+          </a:lstStyle>
+          <a:p>
+            <a:pPr eaLnBrk="1" hangingPunct="1"/>
+            <a:r>
+              <a:rPr lang="es-ES" altLang="es-ES" b="1" dirty="0" err="1">
+                <a:latin typeface="Open Sans" panose="020B0606030504020204" pitchFamily="34" charset="0"/>
+                <a:cs typeface="Open Sans" panose="020B0606030504020204" pitchFamily="34" charset="0"/>
+              </a:rPr>
+              <a:t>Section</a:t>
+            </a:r>
+            <a:r>
+              <a:rPr lang="es-ES" altLang="es-ES" dirty="0">
+                <a:latin typeface="Cabin Regular" pitchFamily="2" charset="0"/>
+              </a:rPr>
+              <a:t> 2</a:t>
+            </a:r>
+          </a:p>
+        </p:txBody>
+      </p:sp>
+      <p:pic>
+        <p:nvPicPr>
+          <p:cNvPr id="9" name="Imagen 5">
+            <a:extLst>
+              <a:ext uri="{FF2B5EF4-FFF2-40B4-BE49-F238E27FC236}">
+                <a16:creationId xmlns:a16="http://schemas.microsoft.com/office/drawing/2014/main" id="{D017E832-6263-1272-99F7-8E9D1EEC54E8}"/>
+              </a:ext>
+            </a:extLst>
+          </p:cNvPr>
+          <p:cNvPicPr>
+            <a:picLocks noChangeAspect="1" noChangeArrowheads="1"/>
+          </p:cNvPicPr>
+          <p:nvPr/>
+        </p:nvPicPr>
+        <p:blipFill>
+          <a:blip r:embed="rId2">
+            <a:extLst>
+              <a:ext uri="{28A0092B-C50C-407E-A947-70E740481C1C}">
+                <a14:useLocalDpi xmlns:a14="http://schemas.microsoft.com/office/drawing/2010/main" val="0"/>
+              </a:ext>
+            </a:extLst>
+          </a:blip>
+          <a:srcRect/>
+          <a:stretch>
+            <a:fillRect/>
+          </a:stretch>
+        </p:blipFill>
+        <p:spPr bwMode="auto">
+          <a:xfrm>
+            <a:off x="11129080" y="122503"/>
+            <a:ext cx="904080" cy="809624"/>
+          </a:xfrm>
+          <a:prstGeom prst="rect">
+            <a:avLst/>
+          </a:prstGeom>
+          <a:noFill/>
+          <a:ln>
+            <a:noFill/>
+          </a:ln>
+          <a:extLst>
+            <a:ext uri="{909E8E84-426E-40DD-AFC4-6F175D3DCCD1}">
+              <a14:hiddenFill xmlns:a14="http://schemas.microsoft.com/office/drawing/2010/main">
+                <a:solidFill>
+                  <a:srgbClr val="FFFFFF"/>
+                </a:solidFill>
+              </a14:hiddenFill>
+            </a:ext>
+            <a:ext uri="{91240B29-F687-4F45-9708-019B960494DF}">
+              <a14:hiddenLine xmlns:a14="http://schemas.microsoft.com/office/drawing/2010/main" w="9525">
+                <a:solidFill>
+                  <a:srgbClr val="000000"/>
+                </a:solidFill>
+                <a:miter lim="800000"/>
+                <a:headEnd/>
+                <a:tailEnd/>
+              </a14:hiddenLine>
+            </a:ext>
+          </a:extLst>
+        </p:spPr>
+      </p:pic>
+      <p:pic>
+        <p:nvPicPr>
+          <p:cNvPr id="10" name="Picture 2">
+            <a:extLst>
+              <a:ext uri="{FF2B5EF4-FFF2-40B4-BE49-F238E27FC236}">
+                <a16:creationId xmlns:a16="http://schemas.microsoft.com/office/drawing/2014/main" id="{23620B47-66DF-0D8A-C4ED-DE956A06BB75}"/>
+              </a:ext>
+            </a:extLst>
+          </p:cNvPr>
+          <p:cNvPicPr>
+            <a:picLocks noChangeAspect="1" noChangeArrowheads="1"/>
+          </p:cNvPicPr>
+          <p:nvPr/>
+        </p:nvPicPr>
+        <p:blipFill>
+          <a:blip r:embed="rId3">
+            <a:extLst>
+              <a:ext uri="{28A0092B-C50C-407E-A947-70E740481C1C}">
+                <a14:useLocalDpi xmlns:a14="http://schemas.microsoft.com/office/drawing/2010/main" val="0"/>
+              </a:ext>
+            </a:extLst>
+          </a:blip>
+          <a:srcRect/>
+          <a:stretch>
+            <a:fillRect/>
+          </a:stretch>
+        </p:blipFill>
+        <p:spPr bwMode="auto">
+          <a:xfrm>
+            <a:off x="158840" y="122503"/>
+            <a:ext cx="1097236" cy="809624"/>
+          </a:xfrm>
+          <a:prstGeom prst="rect">
+            <a:avLst/>
+          </a:prstGeom>
+          <a:noFill/>
+          <a:ln>
+            <a:noFill/>
+          </a:ln>
+          <a:extLst>
+            <a:ext uri="{909E8E84-426E-40DD-AFC4-6F175D3DCCD1}">
+              <a14:hiddenFill xmlns:a14="http://schemas.microsoft.com/office/drawing/2010/main">
+                <a:solidFill>
+                  <a:srgbClr val="FFFFFF"/>
+                </a:solidFill>
+              </a14:hiddenFill>
+            </a:ext>
+            <a:ext uri="{91240B29-F687-4F45-9708-019B960494DF}">
+              <a14:hiddenLine xmlns:a14="http://schemas.microsoft.com/office/drawing/2010/main" w="9525">
+                <a:solidFill>
+                  <a:srgbClr val="000000"/>
+                </a:solidFill>
+                <a:miter lim="800000"/>
+                <a:headEnd/>
+                <a:tailEnd/>
+              </a14:hiddenLine>
+            </a:ext>
+          </a:extLst>
+        </p:spPr>
+      </p:pic>
+    </p:spTree>
+    <p:extLst>
+      <p:ext uri="{BB962C8B-B14F-4D97-AF65-F5344CB8AC3E}">
+        <p14:creationId xmlns:p14="http://schemas.microsoft.com/office/powerpoint/2010/main" val="1104819674"/>
       </p:ext>
     </p:extLst>
   </p:cSld>

</xml_diff>